<commit_message>
enh: more slides for presentation draft
</commit_message>
<xml_diff>
--- a/Final Project/Project_Presentation.pptx
+++ b/Final Project/Project_Presentation.pptx
@@ -8,6 +8,11 @@
     <p:sldId id="256" r:id="rId2"/>
     <p:sldId id="257" r:id="rId3"/>
     <p:sldId id="258" r:id="rId4"/>
+    <p:sldId id="259" r:id="rId5"/>
+    <p:sldId id="260" r:id="rId6"/>
+    <p:sldId id="261" r:id="rId7"/>
+    <p:sldId id="262" r:id="rId8"/>
+    <p:sldId id="263" r:id="rId9"/>
   </p:sldIdLst>
   <p:sldSz cx="12192000" cy="6858000"/>
   <p:notesSz cx="6858000" cy="9144000"/>
@@ -106,6 +111,11 @@
       </a:defRPr>
     </a:lvl9pPr>
   </p:defaultTextStyle>
+  <p:extLst>
+    <p:ext uri="{EFAFB233-063F-42B5-8137-9DF3F51BA10A}">
+      <p15:sldGuideLst xmlns:p15="http://schemas.microsoft.com/office/powerpoint/2012/main"/>
+    </p:ext>
+  </p:extLst>
 </p:presentation>
 </file>
 
@@ -339,7 +349,7 @@
             <a:fld id="{B61BEF0D-F0BB-DE4B-95CE-6DB70DBA9567}" type="datetimeFigureOut">
               <a:rPr lang="en-US" dirty="0"/>
               <a:pPr/>
-              <a:t>7/22/18</a:t>
+              <a:t>7/25/18</a:t>
             </a:fld>
             <a:endParaRPr lang="en-US" dirty="0"/>
           </a:p>
@@ -670,7 +680,7 @@
             <a:fld id="{B61BEF0D-F0BB-DE4B-95CE-6DB70DBA9567}" type="datetimeFigureOut">
               <a:rPr lang="en-US" dirty="0"/>
               <a:pPr/>
-              <a:t>7/22/18</a:t>
+              <a:t>7/25/18</a:t>
             </a:fld>
             <a:endParaRPr lang="en-US" dirty="0"/>
           </a:p>
@@ -945,7 +955,7 @@
             <a:fld id="{B61BEF0D-F0BB-DE4B-95CE-6DB70DBA9567}" type="datetimeFigureOut">
               <a:rPr lang="en-US" dirty="0"/>
               <a:pPr/>
-              <a:t>7/22/18</a:t>
+              <a:t>7/25/18</a:t>
             </a:fld>
             <a:endParaRPr lang="en-US" dirty="0"/>
           </a:p>
@@ -1510,7 +1520,7 @@
             <a:fld id="{B61BEF0D-F0BB-DE4B-95CE-6DB70DBA9567}" type="datetimeFigureOut">
               <a:rPr lang="en-US" dirty="0"/>
               <a:pPr/>
-              <a:t>7/22/18</a:t>
+              <a:t>7/25/18</a:t>
             </a:fld>
             <a:endParaRPr lang="en-US" dirty="0"/>
           </a:p>
@@ -1785,7 +1795,7 @@
             <a:fld id="{B61BEF0D-F0BB-DE4B-95CE-6DB70DBA9567}" type="datetimeFigureOut">
               <a:rPr lang="en-US" dirty="0"/>
               <a:pPr/>
-              <a:t>7/22/18</a:t>
+              <a:t>7/25/18</a:t>
             </a:fld>
             <a:endParaRPr lang="en-US" dirty="0"/>
           </a:p>
@@ -2344,7 +2354,7 @@
             <a:fld id="{B61BEF0D-F0BB-DE4B-95CE-6DB70DBA9567}" type="datetimeFigureOut">
               <a:rPr lang="en-US" dirty="0"/>
               <a:pPr/>
-              <a:t>7/22/18</a:t>
+              <a:t>7/25/18</a:t>
             </a:fld>
             <a:endParaRPr lang="en-US" dirty="0"/>
           </a:p>
@@ -2668,7 +2678,7 @@
             <a:fld id="{B61BEF0D-F0BB-DE4B-95CE-6DB70DBA9567}" type="datetimeFigureOut">
               <a:rPr lang="en-US" dirty="0"/>
               <a:pPr/>
-              <a:t>7/22/18</a:t>
+              <a:t>7/25/18</a:t>
             </a:fld>
             <a:endParaRPr lang="en-US" dirty="0"/>
           </a:p>
@@ -2842,7 +2852,7 @@
             <a:fld id="{B61BEF0D-F0BB-DE4B-95CE-6DB70DBA9567}" type="datetimeFigureOut">
               <a:rPr lang="en-US" dirty="0"/>
               <a:pPr/>
-              <a:t>7/22/18</a:t>
+              <a:t>7/25/18</a:t>
             </a:fld>
             <a:endParaRPr lang="en-US" dirty="0"/>
           </a:p>
@@ -3077,7 +3087,7 @@
             <a:fld id="{B61BEF0D-F0BB-DE4B-95CE-6DB70DBA9567}" type="datetimeFigureOut">
               <a:rPr lang="en-US" dirty="0"/>
               <a:pPr/>
-              <a:t>7/22/18</a:t>
+              <a:t>7/25/18</a:t>
             </a:fld>
             <a:endParaRPr lang="en-US" dirty="0"/>
           </a:p>
@@ -3274,7 +3284,7 @@
             <a:fld id="{B61BEF0D-F0BB-DE4B-95CE-6DB70DBA9567}" type="datetimeFigureOut">
               <a:rPr lang="en-US" dirty="0"/>
               <a:pPr/>
-              <a:t>7/22/18</a:t>
+              <a:t>7/25/18</a:t>
             </a:fld>
             <a:endParaRPr lang="en-US" dirty="0"/>
           </a:p>
@@ -3547,7 +3557,7 @@
             <a:fld id="{B61BEF0D-F0BB-DE4B-95CE-6DB70DBA9567}" type="datetimeFigureOut">
               <a:rPr lang="en-US" dirty="0"/>
               <a:pPr/>
-              <a:t>7/22/18</a:t>
+              <a:t>7/25/18</a:t>
             </a:fld>
             <a:endParaRPr lang="en-US" dirty="0"/>
           </a:p>
@@ -3810,7 +3820,7 @@
             <a:fld id="{B61BEF0D-F0BB-DE4B-95CE-6DB70DBA9567}" type="datetimeFigureOut">
               <a:rPr lang="en-US" dirty="0"/>
               <a:pPr/>
-              <a:t>7/22/18</a:t>
+              <a:t>7/25/18</a:t>
             </a:fld>
             <a:endParaRPr lang="en-US" dirty="0"/>
           </a:p>
@@ -4181,7 +4191,7 @@
             <a:fld id="{B61BEF0D-F0BB-DE4B-95CE-6DB70DBA9567}" type="datetimeFigureOut">
               <a:rPr lang="en-US" dirty="0"/>
               <a:pPr/>
-              <a:t>7/22/18</a:t>
+              <a:t>7/25/18</a:t>
             </a:fld>
             <a:endParaRPr lang="en-US" dirty="0"/>
           </a:p>
@@ -4326,7 +4336,7 @@
             <a:fld id="{B61BEF0D-F0BB-DE4B-95CE-6DB70DBA9567}" type="datetimeFigureOut">
               <a:rPr lang="en-US" dirty="0"/>
               <a:pPr/>
-              <a:t>7/22/18</a:t>
+              <a:t>7/25/18</a:t>
             </a:fld>
             <a:endParaRPr lang="en-US" dirty="0"/>
           </a:p>
@@ -4448,7 +4458,7 @@
             <a:fld id="{B61BEF0D-F0BB-DE4B-95CE-6DB70DBA9567}" type="datetimeFigureOut">
               <a:rPr lang="en-US" dirty="0"/>
               <a:pPr/>
-              <a:t>7/22/18</a:t>
+              <a:t>7/25/18</a:t>
             </a:fld>
             <a:endParaRPr lang="en-US" dirty="0"/>
           </a:p>
@@ -4730,7 +4740,7 @@
             <a:fld id="{B61BEF0D-F0BB-DE4B-95CE-6DB70DBA9567}" type="datetimeFigureOut">
               <a:rPr lang="en-US" dirty="0"/>
               <a:pPr/>
-              <a:t>7/22/18</a:t>
+              <a:t>7/25/18</a:t>
             </a:fld>
             <a:endParaRPr lang="en-US" dirty="0"/>
           </a:p>
@@ -5051,7 +5061,7 @@
             <a:fld id="{B61BEF0D-F0BB-DE4B-95CE-6DB70DBA9567}" type="datetimeFigureOut">
               <a:rPr lang="en-US" dirty="0"/>
               <a:pPr/>
-              <a:t>7/22/18</a:t>
+              <a:t>7/25/18</a:t>
             </a:fld>
             <a:endParaRPr lang="en-US" dirty="0"/>
           </a:p>
@@ -5262,7 +5272,7 @@
             <a:fld id="{B61BEF0D-F0BB-DE4B-95CE-6DB70DBA9567}" type="datetimeFigureOut">
               <a:rPr lang="en-US" dirty="0"/>
               <a:pPr/>
-              <a:t>7/22/18</a:t>
+              <a:t>7/25/18</a:t>
             </a:fld>
             <a:endParaRPr lang="en-US" dirty="0"/>
           </a:p>
@@ -5789,7 +5799,7 @@
         </p:nvSpPr>
         <p:spPr>
           <a:xfrm>
-            <a:off x="1077686" y="729342"/>
+            <a:off x="1240971" y="838199"/>
             <a:ext cx="9960429" cy="1577217"/>
           </a:xfrm>
         </p:spPr>
@@ -5801,7 +5811,7 @@
           <a:p>
             <a:pPr algn="ctr"/>
             <a:r>
-              <a:rPr lang="en-US" sz="3000" dirty="0"/>
+              <a:rPr lang="en-US" sz="3000" b="1" dirty="0"/>
               <a:t>Discovering Unaligned Expectations in Universities and Industry for New Graduates in Computer Science and Software Engineering and Finding Possible Solutions</a:t>
             </a:r>
           </a:p>
@@ -5831,38 +5841,74 @@
         </p:spPr>
         <p:txBody>
           <a:bodyPr>
-            <a:normAutofit lnSpcReduction="10000"/>
+            <a:normAutofit fontScale="92500" lnSpcReduction="10000"/>
           </a:bodyPr>
           <a:lstStyle/>
           <a:p>
             <a:pPr algn="ctr"/>
             <a:r>
-              <a:rPr lang="en-US" sz="2400" dirty="0"/>
-              <a:t>Alan Franzoni &amp; Hasti ghabel</a:t>
+              <a:rPr lang="en-US" sz="2800" dirty="0">
+                <a:solidFill>
+                  <a:srgbClr val="FFC000"/>
+                </a:solidFill>
+              </a:rPr>
+              <a:t>Alan </a:t>
+            </a:r>
+            <a:r>
+              <a:rPr lang="en-US" sz="2800" dirty="0" err="1">
+                <a:solidFill>
+                  <a:srgbClr val="FFC000"/>
+                </a:solidFill>
+              </a:rPr>
+              <a:t>Franzoni</a:t>
+            </a:r>
+            <a:r>
+              <a:rPr lang="en-US" sz="2800" dirty="0">
+                <a:solidFill>
+                  <a:srgbClr val="FFC000"/>
+                </a:solidFill>
+              </a:rPr>
+              <a:t> &amp; Hasti ghabel</a:t>
             </a:r>
           </a:p>
           <a:p>
             <a:pPr algn="ctr"/>
-            <a:endParaRPr lang="en-US" dirty="0"/>
+            <a:endParaRPr lang="en-US" dirty="0">
+              <a:solidFill>
+                <a:srgbClr val="FFC000"/>
+              </a:solidFill>
+            </a:endParaRPr>
           </a:p>
           <a:p>
             <a:pPr algn="ctr"/>
             <a:r>
-              <a:rPr lang="en-US" dirty="0"/>
+              <a:rPr lang="en-US" sz="2400" dirty="0">
+                <a:solidFill>
+                  <a:srgbClr val="FFC000"/>
+                </a:solidFill>
+              </a:rPr>
               <a:t>Georgia Institute of technology</a:t>
             </a:r>
           </a:p>
           <a:p>
             <a:pPr algn="ctr"/>
             <a:r>
-              <a:rPr lang="en-US" dirty="0"/>
-              <a:t>Educational Technology – MSCS 6460</a:t>
+              <a:rPr lang="en-US" dirty="0">
+                <a:solidFill>
+                  <a:srgbClr val="FFC000"/>
+                </a:solidFill>
+              </a:rPr>
+              <a:t>Educational Technology – OMSCS 6460</a:t>
             </a:r>
           </a:p>
           <a:p>
             <a:pPr algn="ctr"/>
             <a:r>
-              <a:rPr lang="en-US" dirty="0"/>
+              <a:rPr lang="en-US" dirty="0">
+                <a:solidFill>
+                  <a:srgbClr val="FFC000"/>
+                </a:solidFill>
+              </a:rPr>
               <a:t>Summer 2018</a:t>
             </a:r>
           </a:p>
@@ -5949,7 +5995,7 @@
         </p:nvSpPr>
         <p:spPr>
           <a:xfrm>
-            <a:off x="685801" y="1698171"/>
+            <a:off x="685801" y="1480452"/>
             <a:ext cx="10131425" cy="4604658"/>
           </a:xfrm>
         </p:spPr>
@@ -5964,7 +6010,7 @@
               <a:buChar char="•"/>
             </a:pPr>
             <a:r>
-              <a:rPr lang="en-US" sz="2000" dirty="0"/>
+              <a:rPr lang="en-US" sz="2400" dirty="0"/>
               <a:t>New graduates from computer science and software engineering do not always possess required skills, abilities or knowledge when joining the tech industry.</a:t>
             </a:r>
           </a:p>
@@ -5974,7 +6020,7 @@
               <a:buChar char="•"/>
             </a:pPr>
             <a:r>
-              <a:rPr lang="en-US" sz="2000" dirty="0"/>
+              <a:rPr lang="en-US" sz="2400" dirty="0"/>
               <a:t>A lot of entry-level jobs actually require three years of experience, which explain the gaps between Engineering Education, and Practice (what an engineer does in real life) do exist </a:t>
             </a:r>
           </a:p>
@@ -5984,7 +6030,7 @@
               <a:buChar char="•"/>
             </a:pPr>
             <a:r>
-              <a:rPr lang="en-US" sz="2000" dirty="0"/>
+              <a:rPr lang="en-US" sz="2400" dirty="0"/>
               <a:t>Some universities and programs even took steps to try and fix this problem in some specific classes </a:t>
             </a:r>
           </a:p>
@@ -5994,21 +6040,9 @@
               <a:buChar char="•"/>
             </a:pPr>
             <a:r>
-              <a:rPr lang="en-US" sz="2000" dirty="0"/>
+              <a:rPr lang="en-US" sz="2400" dirty="0"/>
               <a:t>The acknowledgment of this skill gap and the efforts to train new graduates for the industry go back as far as 1992 </a:t>
             </a:r>
-          </a:p>
-          <a:p>
-            <a:pPr>
-              <a:buFont typeface="Arial" panose="020B0604020202020204" pitchFamily="34" charset="0"/>
-              <a:buChar char="•"/>
-            </a:pPr>
-            <a:endParaRPr lang="en-US" sz="2000" dirty="0"/>
-          </a:p>
-          <a:p>
-            <a:pPr marL="0" indent="0">
-              <a:buNone/>
-            </a:pPr>
             <a:endParaRPr lang="en-US" sz="2000" dirty="0"/>
           </a:p>
         </p:txBody>
@@ -6059,12 +6093,22 @@
             <p:ph type="title"/>
           </p:nvPr>
         </p:nvSpPr>
-        <p:spPr/>
-        <p:txBody>
-          <a:bodyPr/>
-          <a:lstStyle/>
-          <a:p>
-            <a:endParaRPr lang="en-US"/>
+        <p:spPr>
+          <a:xfrm>
+            <a:off x="685801" y="609600"/>
+            <a:ext cx="10131425" cy="576943"/>
+          </a:xfrm>
+        </p:spPr>
+        <p:txBody>
+          <a:bodyPr>
+            <a:normAutofit fontScale="90000"/>
+          </a:bodyPr>
+          <a:lstStyle/>
+          <a:p>
+            <a:r>
+              <a:rPr lang="en-US" dirty="0"/>
+              <a:t>Research Questions</a:t>
+            </a:r>
           </a:p>
         </p:txBody>
       </p:sp>
@@ -6084,12 +6128,69 @@
             <p:ph idx="1"/>
           </p:nvPr>
         </p:nvSpPr>
-        <p:spPr/>
-        <p:txBody>
-          <a:bodyPr/>
-          <a:lstStyle/>
-          <a:p>
-            <a:endParaRPr lang="en-US"/>
+        <p:spPr>
+          <a:xfrm>
+            <a:off x="685801" y="1186543"/>
+            <a:ext cx="10131425" cy="5040086"/>
+          </a:xfrm>
+        </p:spPr>
+        <p:txBody>
+          <a:bodyPr>
+            <a:normAutofit lnSpcReduction="10000"/>
+          </a:bodyPr>
+          <a:lstStyle/>
+          <a:p>
+            <a:r>
+              <a:rPr lang="en-US" sz="2400" dirty="0"/>
+              <a:t>Does the perceived skill gap in fresh graduates exist because:</a:t>
+            </a:r>
+          </a:p>
+          <a:p>
+            <a:pPr lvl="1"/>
+            <a:r>
+              <a:rPr lang="en-US" sz="2400" dirty="0"/>
+              <a:t>The academy is unable to provide a good training, </a:t>
+            </a:r>
+          </a:p>
+          <a:p>
+            <a:pPr lvl="1"/>
+            <a:r>
+              <a:rPr lang="en-US" sz="2400" dirty="0"/>
+              <a:t>The academy is not even trying to do that kind of job,</a:t>
+            </a:r>
+          </a:p>
+          <a:p>
+            <a:pPr lvl="1"/>
+            <a:r>
+              <a:rPr lang="en-US" sz="2400" dirty="0"/>
+              <a:t>The industry is taking that kind of job for granted,</a:t>
+            </a:r>
+          </a:p>
+          <a:p>
+            <a:pPr lvl="1"/>
+            <a:r>
+              <a:rPr lang="en-US" sz="2400" dirty="0"/>
+              <a:t>The students think they should be getting something that the university has no intention to provide them with?</a:t>
+            </a:r>
+          </a:p>
+          <a:p>
+            <a:r>
+              <a:rPr lang="en-US" sz="2400" dirty="0"/>
+              <a:t>How the students’ degree can improve the chance of getting hired? Do the graduate-level studies help the students to gain adaptive skills in industry more quickly? </a:t>
+            </a:r>
+          </a:p>
+          <a:p>
+            <a:r>
+              <a:rPr lang="en-US" sz="2400" dirty="0"/>
+              <a:t>Solutions?</a:t>
+            </a:r>
+          </a:p>
+          <a:p>
+            <a:pPr lvl="1"/>
+            <a:r>
+              <a:rPr lang="en-US" sz="2400" dirty="0"/>
+              <a:t>what would be the best solutions that bring the university and industry’s objectives closer to each other? </a:t>
+            </a:r>
           </a:p>
         </p:txBody>
       </p:sp>
@@ -6097,6 +6198,495 @@
     <p:extLst>
       <p:ext uri="{BB962C8B-B14F-4D97-AF65-F5344CB8AC3E}">
         <p14:creationId xmlns:p14="http://schemas.microsoft.com/office/powerpoint/2010/main" val="3723162893"/>
+      </p:ext>
+    </p:extLst>
+  </p:cSld>
+  <p:clrMapOvr>
+    <a:masterClrMapping/>
+  </p:clrMapOvr>
+</p:sld>
+</file>
+
+<file path=ppt/slides/slide4.xml><?xml version="1.0" encoding="utf-8"?>
+<p:sld xmlns:a="http://schemas.openxmlformats.org/drawingml/2006/main" xmlns:r="http://schemas.openxmlformats.org/officeDocument/2006/relationships" xmlns:p="http://schemas.openxmlformats.org/presentationml/2006/main">
+  <p:cSld>
+    <p:spTree>
+      <p:nvGrpSpPr>
+        <p:cNvPr id="1" name=""/>
+        <p:cNvGrpSpPr/>
+        <p:nvPr/>
+      </p:nvGrpSpPr>
+      <p:grpSpPr>
+        <a:xfrm>
+          <a:off x="0" y="0"/>
+          <a:ext cx="0" cy="0"/>
+          <a:chOff x="0" y="0"/>
+          <a:chExt cx="0" cy="0"/>
+        </a:xfrm>
+      </p:grpSpPr>
+      <p:sp>
+        <p:nvSpPr>
+          <p:cNvPr id="2" name="Title 1">
+            <a:extLst>
+              <a:ext uri="{FF2B5EF4-FFF2-40B4-BE49-F238E27FC236}">
+                <a16:creationId xmlns:a16="http://schemas.microsoft.com/office/drawing/2014/main" id="{19AF41A6-9410-C647-8752-1DE43128A364}"/>
+              </a:ext>
+            </a:extLst>
+          </p:cNvPr>
+          <p:cNvSpPr>
+            <a:spLocks noGrp="1"/>
+          </p:cNvSpPr>
+          <p:nvPr>
+            <p:ph type="title"/>
+          </p:nvPr>
+        </p:nvSpPr>
+        <p:spPr>
+          <a:xfrm>
+            <a:off x="685801" y="609600"/>
+            <a:ext cx="10131425" cy="718457"/>
+          </a:xfrm>
+        </p:spPr>
+        <p:txBody>
+          <a:bodyPr/>
+          <a:lstStyle/>
+          <a:p>
+            <a:r>
+              <a:rPr lang="en-US" dirty="0"/>
+              <a:t>Hypothesis</a:t>
+            </a:r>
+          </a:p>
+        </p:txBody>
+      </p:sp>
+      <p:sp>
+        <p:nvSpPr>
+          <p:cNvPr id="3" name="Content Placeholder 2">
+            <a:extLst>
+              <a:ext uri="{FF2B5EF4-FFF2-40B4-BE49-F238E27FC236}">
+                <a16:creationId xmlns:a16="http://schemas.microsoft.com/office/drawing/2014/main" id="{B43EB408-7228-2F40-94CA-7C5D48CC5D0B}"/>
+              </a:ext>
+            </a:extLst>
+          </p:cNvPr>
+          <p:cNvSpPr>
+            <a:spLocks noGrp="1"/>
+          </p:cNvSpPr>
+          <p:nvPr>
+            <p:ph idx="1"/>
+          </p:nvPr>
+        </p:nvSpPr>
+        <p:spPr>
+          <a:xfrm>
+            <a:off x="685801" y="1741717"/>
+            <a:ext cx="10131425" cy="4463143"/>
+          </a:xfrm>
+        </p:spPr>
+        <p:txBody>
+          <a:bodyPr>
+            <a:normAutofit/>
+          </a:bodyPr>
+          <a:lstStyle/>
+          <a:p>
+            <a:pPr marL="514350" indent="-514350">
+              <a:buFont typeface="+mj-lt"/>
+              <a:buAutoNum type="arabicPeriod"/>
+            </a:pPr>
+            <a:r>
+              <a:rPr lang="en-US" sz="2400" dirty="0"/>
+              <a:t>One of the reasons for the perceived skill gap is the misaligned expectations between industry and university. The expectations differ among four groups: Undergraduate-level students, graduate-level students, teachers and professors, and industry professionals.</a:t>
+            </a:r>
+          </a:p>
+          <a:p>
+            <a:pPr marL="0" indent="0">
+              <a:buNone/>
+            </a:pPr>
+            <a:endParaRPr lang="en-US" sz="2400" dirty="0"/>
+          </a:p>
+          <a:p>
+            <a:pPr marL="514350" indent="-514350">
+              <a:buFont typeface="+mj-lt"/>
+              <a:buAutoNum type="arabicPeriod" startAt="2"/>
+            </a:pPr>
+            <a:r>
+              <a:rPr lang="en-US" sz="2400" dirty="0"/>
+              <a:t>Graduate-level studies can reduce the skill gap and students can improve their expertise by joining high quality online graduate-level programs such as GT OMSCS, which their goals are quite aligned with industry expectations.</a:t>
+            </a:r>
+          </a:p>
+          <a:p>
+            <a:endParaRPr lang="en-US" sz="2400" dirty="0"/>
+          </a:p>
+        </p:txBody>
+      </p:sp>
+    </p:spTree>
+    <p:extLst>
+      <p:ext uri="{BB962C8B-B14F-4D97-AF65-F5344CB8AC3E}">
+        <p14:creationId xmlns:p14="http://schemas.microsoft.com/office/powerpoint/2010/main" val="4015325708"/>
+      </p:ext>
+    </p:extLst>
+  </p:cSld>
+  <p:clrMapOvr>
+    <a:masterClrMapping/>
+  </p:clrMapOvr>
+</p:sld>
+</file>
+
+<file path=ppt/slides/slide5.xml><?xml version="1.0" encoding="utf-8"?>
+<p:sld xmlns:a="http://schemas.openxmlformats.org/drawingml/2006/main" xmlns:r="http://schemas.openxmlformats.org/officeDocument/2006/relationships" xmlns:p="http://schemas.openxmlformats.org/presentationml/2006/main">
+  <p:cSld>
+    <p:spTree>
+      <p:nvGrpSpPr>
+        <p:cNvPr id="1" name=""/>
+        <p:cNvGrpSpPr/>
+        <p:nvPr/>
+      </p:nvGrpSpPr>
+      <p:grpSpPr>
+        <a:xfrm>
+          <a:off x="0" y="0"/>
+          <a:ext cx="0" cy="0"/>
+          <a:chOff x="0" y="0"/>
+          <a:chExt cx="0" cy="0"/>
+        </a:xfrm>
+      </p:grpSpPr>
+      <p:sp>
+        <p:nvSpPr>
+          <p:cNvPr id="2" name="Title 1">
+            <a:extLst>
+              <a:ext uri="{FF2B5EF4-FFF2-40B4-BE49-F238E27FC236}">
+                <a16:creationId xmlns:a16="http://schemas.microsoft.com/office/drawing/2014/main" id="{2A8997C9-D990-F541-8172-17585C9FF022}"/>
+              </a:ext>
+            </a:extLst>
+          </p:cNvPr>
+          <p:cNvSpPr>
+            <a:spLocks noGrp="1"/>
+          </p:cNvSpPr>
+          <p:nvPr>
+            <p:ph type="title"/>
+          </p:nvPr>
+        </p:nvSpPr>
+        <p:spPr>
+          <a:xfrm>
+            <a:off x="685801" y="609600"/>
+            <a:ext cx="10131425" cy="816429"/>
+          </a:xfrm>
+        </p:spPr>
+        <p:txBody>
+          <a:bodyPr/>
+          <a:lstStyle/>
+          <a:p>
+            <a:r>
+              <a:rPr lang="en-US" dirty="0"/>
+              <a:t>Our Research Methodology</a:t>
+            </a:r>
+          </a:p>
+        </p:txBody>
+      </p:sp>
+      <p:sp>
+        <p:nvSpPr>
+          <p:cNvPr id="3" name="Content Placeholder 2">
+            <a:extLst>
+              <a:ext uri="{FF2B5EF4-FFF2-40B4-BE49-F238E27FC236}">
+                <a16:creationId xmlns:a16="http://schemas.microsoft.com/office/drawing/2014/main" id="{B3AD7D23-EC6D-C743-B96C-BFC3F9D959E2}"/>
+              </a:ext>
+            </a:extLst>
+          </p:cNvPr>
+          <p:cNvSpPr>
+            <a:spLocks noGrp="1"/>
+          </p:cNvSpPr>
+          <p:nvPr>
+            <p:ph idx="1"/>
+          </p:nvPr>
+        </p:nvSpPr>
+        <p:spPr>
+          <a:xfrm>
+            <a:off x="685801" y="1426029"/>
+            <a:ext cx="10131425" cy="4365171"/>
+          </a:xfrm>
+        </p:spPr>
+        <p:txBody>
+          <a:bodyPr/>
+          <a:lstStyle/>
+          <a:p>
+            <a:r>
+              <a:rPr lang="en-US" dirty="0"/>
+              <a:t>Created a website (</a:t>
+            </a:r>
+            <a:r>
+              <a:rPr lang="en-US" dirty="0">
+                <a:hlinkClick r:id="rId2"/>
+              </a:rPr>
+              <a:t>http://www.misalignedtech.com/</a:t>
+            </a:r>
+            <a:r>
+              <a:rPr lang="en-US" dirty="0"/>
+              <a:t>), where we described our research goals and descriptions.</a:t>
+            </a:r>
+          </a:p>
+          <a:p>
+            <a:r>
+              <a:rPr lang="en-US" dirty="0"/>
+              <a:t> Created a survey  and shared it with many different groups.</a:t>
+            </a:r>
+          </a:p>
+          <a:p>
+            <a:r>
+              <a:rPr lang="en-US" dirty="0"/>
+              <a:t>Created dependent and independent variables to analyze the data and create the graphs.</a:t>
+            </a:r>
+          </a:p>
+          <a:p>
+            <a:endParaRPr lang="en-US" dirty="0"/>
+          </a:p>
+        </p:txBody>
+      </p:sp>
+    </p:spTree>
+    <p:extLst>
+      <p:ext uri="{BB962C8B-B14F-4D97-AF65-F5344CB8AC3E}">
+        <p14:creationId xmlns:p14="http://schemas.microsoft.com/office/powerpoint/2010/main" val="2731102612"/>
+      </p:ext>
+    </p:extLst>
+  </p:cSld>
+  <p:clrMapOvr>
+    <a:masterClrMapping/>
+  </p:clrMapOvr>
+</p:sld>
+</file>
+
+<file path=ppt/slides/slide6.xml><?xml version="1.0" encoding="utf-8"?>
+<p:sld xmlns:a="http://schemas.openxmlformats.org/drawingml/2006/main" xmlns:r="http://schemas.openxmlformats.org/officeDocument/2006/relationships" xmlns:p="http://schemas.openxmlformats.org/presentationml/2006/main">
+  <p:cSld>
+    <p:spTree>
+      <p:nvGrpSpPr>
+        <p:cNvPr id="1" name=""/>
+        <p:cNvGrpSpPr/>
+        <p:nvPr/>
+      </p:nvGrpSpPr>
+      <p:grpSpPr>
+        <a:xfrm>
+          <a:off x="0" y="0"/>
+          <a:ext cx="0" cy="0"/>
+          <a:chOff x="0" y="0"/>
+          <a:chExt cx="0" cy="0"/>
+        </a:xfrm>
+      </p:grpSpPr>
+      <p:sp>
+        <p:nvSpPr>
+          <p:cNvPr id="2" name="Title 1">
+            <a:extLst>
+              <a:ext uri="{FF2B5EF4-FFF2-40B4-BE49-F238E27FC236}">
+                <a16:creationId xmlns:a16="http://schemas.microsoft.com/office/drawing/2014/main" id="{F0E40F80-F76C-8A42-9251-9967E914811E}"/>
+              </a:ext>
+            </a:extLst>
+          </p:cNvPr>
+          <p:cNvSpPr>
+            <a:spLocks noGrp="1"/>
+          </p:cNvSpPr>
+          <p:nvPr>
+            <p:ph type="title"/>
+          </p:nvPr>
+        </p:nvSpPr>
+        <p:spPr>
+          <a:xfrm>
+            <a:off x="979715" y="2427514"/>
+            <a:ext cx="10131425" cy="1891695"/>
+          </a:xfrm>
+        </p:spPr>
+        <p:txBody>
+          <a:bodyPr>
+            <a:normAutofit/>
+          </a:bodyPr>
+          <a:lstStyle/>
+          <a:p>
+            <a:pPr algn="ctr"/>
+            <a:r>
+              <a:rPr lang="en-US" sz="6600" b="1" dirty="0"/>
+              <a:t>RESULTS</a:t>
+            </a:r>
+          </a:p>
+        </p:txBody>
+      </p:sp>
+    </p:spTree>
+    <p:extLst>
+      <p:ext uri="{BB962C8B-B14F-4D97-AF65-F5344CB8AC3E}">
+        <p14:creationId xmlns:p14="http://schemas.microsoft.com/office/powerpoint/2010/main" val="1095411268"/>
+      </p:ext>
+    </p:extLst>
+  </p:cSld>
+  <p:clrMapOvr>
+    <a:masterClrMapping/>
+  </p:clrMapOvr>
+</p:sld>
+</file>
+
+<file path=ppt/slides/slide7.xml><?xml version="1.0" encoding="utf-8"?>
+<p:sld xmlns:a="http://schemas.openxmlformats.org/drawingml/2006/main" xmlns:r="http://schemas.openxmlformats.org/officeDocument/2006/relationships" xmlns:p="http://schemas.openxmlformats.org/presentationml/2006/main">
+  <p:cSld>
+    <p:spTree>
+      <p:nvGrpSpPr>
+        <p:cNvPr id="1" name=""/>
+        <p:cNvGrpSpPr/>
+        <p:nvPr/>
+      </p:nvGrpSpPr>
+      <p:grpSpPr>
+        <a:xfrm>
+          <a:off x="0" y="0"/>
+          <a:ext cx="0" cy="0"/>
+          <a:chOff x="0" y="0"/>
+          <a:chExt cx="0" cy="0"/>
+        </a:xfrm>
+      </p:grpSpPr>
+      <p:sp>
+        <p:nvSpPr>
+          <p:cNvPr id="2" name="Title 1">
+            <a:extLst>
+              <a:ext uri="{FF2B5EF4-FFF2-40B4-BE49-F238E27FC236}">
+                <a16:creationId xmlns:a16="http://schemas.microsoft.com/office/drawing/2014/main" id="{101B1790-A3D7-8B43-B03F-98E8637DA024}"/>
+              </a:ext>
+            </a:extLst>
+          </p:cNvPr>
+          <p:cNvSpPr>
+            <a:spLocks noGrp="1"/>
+          </p:cNvSpPr>
+          <p:nvPr>
+            <p:ph type="title"/>
+          </p:nvPr>
+        </p:nvSpPr>
+        <p:spPr>
+          <a:xfrm>
+            <a:off x="685801" y="609601"/>
+            <a:ext cx="10131425" cy="914400"/>
+          </a:xfrm>
+        </p:spPr>
+        <p:txBody>
+          <a:bodyPr/>
+          <a:lstStyle/>
+          <a:p>
+            <a:r>
+              <a:rPr lang="en-US" dirty="0"/>
+              <a:t>How GPA affects the chances of getting hired</a:t>
+            </a:r>
+          </a:p>
+        </p:txBody>
+      </p:sp>
+      <p:sp>
+        <p:nvSpPr>
+          <p:cNvPr id="3" name="Content Placeholder 2">
+            <a:extLst>
+              <a:ext uri="{FF2B5EF4-FFF2-40B4-BE49-F238E27FC236}">
+                <a16:creationId xmlns:a16="http://schemas.microsoft.com/office/drawing/2014/main" id="{1169A237-F9F6-F046-8F9D-AFD285547ACC}"/>
+              </a:ext>
+            </a:extLst>
+          </p:cNvPr>
+          <p:cNvSpPr>
+            <a:spLocks noGrp="1"/>
+          </p:cNvSpPr>
+          <p:nvPr>
+            <p:ph idx="1"/>
+          </p:nvPr>
+        </p:nvSpPr>
+        <p:spPr/>
+        <p:txBody>
+          <a:bodyPr/>
+          <a:lstStyle/>
+          <a:p>
+            <a:endParaRPr lang="en-US"/>
+          </a:p>
+        </p:txBody>
+      </p:sp>
+    </p:spTree>
+    <p:extLst>
+      <p:ext uri="{BB962C8B-B14F-4D97-AF65-F5344CB8AC3E}">
+        <p14:creationId xmlns:p14="http://schemas.microsoft.com/office/powerpoint/2010/main" val="2398719683"/>
+      </p:ext>
+    </p:extLst>
+  </p:cSld>
+  <p:clrMapOvr>
+    <a:masterClrMapping/>
+  </p:clrMapOvr>
+</p:sld>
+</file>
+
+<file path=ppt/slides/slide8.xml><?xml version="1.0" encoding="utf-8"?>
+<p:sld xmlns:a="http://schemas.openxmlformats.org/drawingml/2006/main" xmlns:r="http://schemas.openxmlformats.org/officeDocument/2006/relationships" xmlns:p="http://schemas.openxmlformats.org/presentationml/2006/main">
+  <p:cSld>
+    <p:spTree>
+      <p:nvGrpSpPr>
+        <p:cNvPr id="1" name=""/>
+        <p:cNvGrpSpPr/>
+        <p:nvPr/>
+      </p:nvGrpSpPr>
+      <p:grpSpPr>
+        <a:xfrm>
+          <a:off x="0" y="0"/>
+          <a:ext cx="0" cy="0"/>
+          <a:chOff x="0" y="0"/>
+          <a:chExt cx="0" cy="0"/>
+        </a:xfrm>
+      </p:grpSpPr>
+      <p:sp>
+        <p:nvSpPr>
+          <p:cNvPr id="2" name="Title 1">
+            <a:extLst>
+              <a:ext uri="{FF2B5EF4-FFF2-40B4-BE49-F238E27FC236}">
+                <a16:creationId xmlns:a16="http://schemas.microsoft.com/office/drawing/2014/main" id="{7815FB45-D42B-4645-8100-FBE38B713ECB}"/>
+              </a:ext>
+            </a:extLst>
+          </p:cNvPr>
+          <p:cNvSpPr>
+            <a:spLocks noGrp="1"/>
+          </p:cNvSpPr>
+          <p:nvPr>
+            <p:ph type="title"/>
+          </p:nvPr>
+        </p:nvSpPr>
+        <p:spPr>
+          <a:xfrm>
+            <a:off x="685801" y="609600"/>
+            <a:ext cx="10131425" cy="881743"/>
+          </a:xfrm>
+        </p:spPr>
+        <p:txBody>
+          <a:bodyPr/>
+          <a:lstStyle/>
+          <a:p>
+            <a:r>
+              <a:rPr lang="en-US" dirty="0"/>
+              <a:t>Time-period to get hired after graduation</a:t>
+            </a:r>
+          </a:p>
+        </p:txBody>
+      </p:sp>
+      <p:sp>
+        <p:nvSpPr>
+          <p:cNvPr id="3" name="Content Placeholder 2">
+            <a:extLst>
+              <a:ext uri="{FF2B5EF4-FFF2-40B4-BE49-F238E27FC236}">
+                <a16:creationId xmlns:a16="http://schemas.microsoft.com/office/drawing/2014/main" id="{BF21D725-0D6E-6544-AEE8-50B536FF489C}"/>
+              </a:ext>
+            </a:extLst>
+          </p:cNvPr>
+          <p:cNvSpPr>
+            <a:spLocks noGrp="1"/>
+          </p:cNvSpPr>
+          <p:nvPr>
+            <p:ph idx="1"/>
+          </p:nvPr>
+        </p:nvSpPr>
+        <p:spPr>
+          <a:xfrm>
+            <a:off x="685801" y="1415143"/>
+            <a:ext cx="10131425" cy="4506686"/>
+          </a:xfrm>
+        </p:spPr>
+        <p:txBody>
+          <a:bodyPr/>
+          <a:lstStyle/>
+          <a:p>
+            <a:endParaRPr lang="en-US"/>
+          </a:p>
+        </p:txBody>
+      </p:sp>
+    </p:spTree>
+    <p:extLst>
+      <p:ext uri="{BB962C8B-B14F-4D97-AF65-F5344CB8AC3E}">
+        <p14:creationId xmlns:p14="http://schemas.microsoft.com/office/powerpoint/2010/main" val="367043702"/>
       </p:ext>
     </p:extLst>
   </p:cSld>

</xml_diff>

<commit_message>
how to record narrator on slides and test recordings
</commit_message>
<xml_diff>
--- a/Final Project/Project_Presentation.pptx
+++ b/Final Project/Project_Presentation.pptx
@@ -4,6 +4,9 @@
   <p:sldMasterIdLst>
     <p:sldMasterId id="2147483648" r:id="rId1"/>
   </p:sldMasterIdLst>
+  <p:notesMasterIdLst>
+    <p:notesMasterId r:id="rId10"/>
+  </p:notesMasterIdLst>
   <p:sldIdLst>
     <p:sldId id="256" r:id="rId2"/>
     <p:sldId id="257" r:id="rId3"/>
@@ -117,6 +120,439 @@
     </p:ext>
   </p:extLst>
 </p:presentation>
+</file>
+
+<file path=ppt/notesMasters/notesMaster1.xml><?xml version="1.0" encoding="utf-8"?>
+<p:notesMaster xmlns:a="http://schemas.openxmlformats.org/drawingml/2006/main" xmlns:r="http://schemas.openxmlformats.org/officeDocument/2006/relationships" xmlns:p="http://schemas.openxmlformats.org/presentationml/2006/main">
+  <p:cSld>
+    <p:bg>
+      <p:bgRef idx="1001">
+        <a:schemeClr val="bg1"/>
+      </p:bgRef>
+    </p:bg>
+    <p:spTree>
+      <p:nvGrpSpPr>
+        <p:cNvPr id="1" name=""/>
+        <p:cNvGrpSpPr/>
+        <p:nvPr/>
+      </p:nvGrpSpPr>
+      <p:grpSpPr>
+        <a:xfrm>
+          <a:off x="0" y="0"/>
+          <a:ext cx="0" cy="0"/>
+          <a:chOff x="0" y="0"/>
+          <a:chExt cx="0" cy="0"/>
+        </a:xfrm>
+      </p:grpSpPr>
+      <p:sp>
+        <p:nvSpPr>
+          <p:cNvPr id="2" name="Header Placeholder 1"/>
+          <p:cNvSpPr>
+            <a:spLocks noGrp="1"/>
+          </p:cNvSpPr>
+          <p:nvPr>
+            <p:ph type="hdr" sz="quarter"/>
+          </p:nvPr>
+        </p:nvSpPr>
+        <p:spPr>
+          <a:xfrm>
+            <a:off x="0" y="0"/>
+            <a:ext cx="2971800" cy="458788"/>
+          </a:xfrm>
+          <a:prstGeom prst="rect">
+            <a:avLst/>
+          </a:prstGeom>
+        </p:spPr>
+        <p:txBody>
+          <a:bodyPr vert="horz" lIns="91440" tIns="45720" rIns="91440" bIns="45720" rtlCol="0"/>
+          <a:lstStyle>
+            <a:lvl1pPr algn="l">
+              <a:defRPr sz="1200"/>
+            </a:lvl1pPr>
+          </a:lstStyle>
+          <a:p>
+            <a:endParaRPr lang="en-US"/>
+          </a:p>
+        </p:txBody>
+      </p:sp>
+      <p:sp>
+        <p:nvSpPr>
+          <p:cNvPr id="3" name="Date Placeholder 2"/>
+          <p:cNvSpPr>
+            <a:spLocks noGrp="1"/>
+          </p:cNvSpPr>
+          <p:nvPr>
+            <p:ph type="dt" idx="1"/>
+          </p:nvPr>
+        </p:nvSpPr>
+        <p:spPr>
+          <a:xfrm>
+            <a:off x="3884613" y="0"/>
+            <a:ext cx="2971800" cy="458788"/>
+          </a:xfrm>
+          <a:prstGeom prst="rect">
+            <a:avLst/>
+          </a:prstGeom>
+        </p:spPr>
+        <p:txBody>
+          <a:bodyPr vert="horz" lIns="91440" tIns="45720" rIns="91440" bIns="45720" rtlCol="0"/>
+          <a:lstStyle>
+            <a:lvl1pPr algn="r">
+              <a:defRPr sz="1200"/>
+            </a:lvl1pPr>
+          </a:lstStyle>
+          <a:p>
+            <a:fld id="{31AF29DE-FEFE-E843-A0F7-EB84C8B1B0FE}" type="datetimeFigureOut">
+              <a:rPr lang="en-US" smtClean="0"/>
+              <a:t>7/25/18</a:t>
+            </a:fld>
+            <a:endParaRPr lang="en-US"/>
+          </a:p>
+        </p:txBody>
+      </p:sp>
+      <p:sp>
+        <p:nvSpPr>
+          <p:cNvPr id="4" name="Slide Image Placeholder 3"/>
+          <p:cNvSpPr>
+            <a:spLocks noGrp="1" noRot="1" noChangeAspect="1"/>
+          </p:cNvSpPr>
+          <p:nvPr>
+            <p:ph type="sldImg" idx="2"/>
+          </p:nvPr>
+        </p:nvSpPr>
+        <p:spPr>
+          <a:xfrm>
+            <a:off x="685800" y="1143000"/>
+            <a:ext cx="5486400" cy="3086100"/>
+          </a:xfrm>
+          <a:prstGeom prst="rect">
+            <a:avLst/>
+          </a:prstGeom>
+          <a:noFill/>
+          <a:ln w="12700">
+            <a:solidFill>
+              <a:prstClr val="black"/>
+            </a:solidFill>
+          </a:ln>
+        </p:spPr>
+        <p:txBody>
+          <a:bodyPr vert="horz" lIns="91440" tIns="45720" rIns="91440" bIns="45720" rtlCol="0" anchor="ctr"/>
+          <a:lstStyle/>
+          <a:p>
+            <a:endParaRPr lang="en-US"/>
+          </a:p>
+        </p:txBody>
+      </p:sp>
+      <p:sp>
+        <p:nvSpPr>
+          <p:cNvPr id="5" name="Notes Placeholder 4"/>
+          <p:cNvSpPr>
+            <a:spLocks noGrp="1"/>
+          </p:cNvSpPr>
+          <p:nvPr>
+            <p:ph type="body" sz="quarter" idx="3"/>
+          </p:nvPr>
+        </p:nvSpPr>
+        <p:spPr>
+          <a:xfrm>
+            <a:off x="685800" y="4400550"/>
+            <a:ext cx="5486400" cy="3600450"/>
+          </a:xfrm>
+          <a:prstGeom prst="rect">
+            <a:avLst/>
+          </a:prstGeom>
+        </p:spPr>
+        <p:txBody>
+          <a:bodyPr vert="horz" lIns="91440" tIns="45720" rIns="91440" bIns="45720" rtlCol="0"/>
+          <a:lstStyle/>
+          <a:p>
+            <a:pPr lvl="0"/>
+            <a:r>
+              <a:rPr lang="en-US"/>
+              <a:t>Edit Master text styles</a:t>
+            </a:r>
+          </a:p>
+          <a:p>
+            <a:pPr lvl="1"/>
+            <a:r>
+              <a:rPr lang="en-US"/>
+              <a:t>Second level</a:t>
+            </a:r>
+          </a:p>
+          <a:p>
+            <a:pPr lvl="2"/>
+            <a:r>
+              <a:rPr lang="en-US"/>
+              <a:t>Third level</a:t>
+            </a:r>
+          </a:p>
+          <a:p>
+            <a:pPr lvl="3"/>
+            <a:r>
+              <a:rPr lang="en-US"/>
+              <a:t>Fourth level</a:t>
+            </a:r>
+          </a:p>
+          <a:p>
+            <a:pPr lvl="4"/>
+            <a:r>
+              <a:rPr lang="en-US"/>
+              <a:t>Fifth level</a:t>
+            </a:r>
+          </a:p>
+        </p:txBody>
+      </p:sp>
+      <p:sp>
+        <p:nvSpPr>
+          <p:cNvPr id="6" name="Footer Placeholder 5"/>
+          <p:cNvSpPr>
+            <a:spLocks noGrp="1"/>
+          </p:cNvSpPr>
+          <p:nvPr>
+            <p:ph type="ftr" sz="quarter" idx="4"/>
+          </p:nvPr>
+        </p:nvSpPr>
+        <p:spPr>
+          <a:xfrm>
+            <a:off x="0" y="8685213"/>
+            <a:ext cx="2971800" cy="458787"/>
+          </a:xfrm>
+          <a:prstGeom prst="rect">
+            <a:avLst/>
+          </a:prstGeom>
+        </p:spPr>
+        <p:txBody>
+          <a:bodyPr vert="horz" lIns="91440" tIns="45720" rIns="91440" bIns="45720" rtlCol="0" anchor="b"/>
+          <a:lstStyle>
+            <a:lvl1pPr algn="l">
+              <a:defRPr sz="1200"/>
+            </a:lvl1pPr>
+          </a:lstStyle>
+          <a:p>
+            <a:endParaRPr lang="en-US"/>
+          </a:p>
+        </p:txBody>
+      </p:sp>
+      <p:sp>
+        <p:nvSpPr>
+          <p:cNvPr id="7" name="Slide Number Placeholder 6"/>
+          <p:cNvSpPr>
+            <a:spLocks noGrp="1"/>
+          </p:cNvSpPr>
+          <p:nvPr>
+            <p:ph type="sldNum" sz="quarter" idx="5"/>
+          </p:nvPr>
+        </p:nvSpPr>
+        <p:spPr>
+          <a:xfrm>
+            <a:off x="3884613" y="8685213"/>
+            <a:ext cx="2971800" cy="458787"/>
+          </a:xfrm>
+          <a:prstGeom prst="rect">
+            <a:avLst/>
+          </a:prstGeom>
+        </p:spPr>
+        <p:txBody>
+          <a:bodyPr vert="horz" lIns="91440" tIns="45720" rIns="91440" bIns="45720" rtlCol="0" anchor="b"/>
+          <a:lstStyle>
+            <a:lvl1pPr algn="r">
+              <a:defRPr sz="1200"/>
+            </a:lvl1pPr>
+          </a:lstStyle>
+          <a:p>
+            <a:fld id="{DAFE4E38-B8CF-D14B-AFD1-14DC91F3B649}" type="slidenum">
+              <a:rPr lang="en-US" smtClean="0"/>
+              <a:t>‹#›</a:t>
+            </a:fld>
+            <a:endParaRPr lang="en-US"/>
+          </a:p>
+        </p:txBody>
+      </p:sp>
+    </p:spTree>
+    <p:extLst>
+      <p:ext uri="{BB962C8B-B14F-4D97-AF65-F5344CB8AC3E}">
+        <p14:creationId xmlns:p14="http://schemas.microsoft.com/office/powerpoint/2010/main" val="246933485"/>
+      </p:ext>
+    </p:extLst>
+  </p:cSld>
+  <p:clrMap bg1="lt1" tx1="dk1" bg2="lt2" tx2="dk2" accent1="accent1" accent2="accent2" accent3="accent3" accent4="accent4" accent5="accent5" accent6="accent6" hlink="hlink" folHlink="folHlink"/>
+  <p:notesStyle>
+    <a:lvl1pPr marL="0" algn="l" defTabSz="914400" rtl="0" eaLnBrk="1" latinLnBrk="0" hangingPunct="1">
+      <a:defRPr sz="1200" kern="1200">
+        <a:solidFill>
+          <a:schemeClr val="tx1"/>
+        </a:solidFill>
+        <a:latin typeface="+mn-lt"/>
+        <a:ea typeface="+mn-ea"/>
+        <a:cs typeface="+mn-cs"/>
+      </a:defRPr>
+    </a:lvl1pPr>
+    <a:lvl2pPr marL="457200" algn="l" defTabSz="914400" rtl="0" eaLnBrk="1" latinLnBrk="0" hangingPunct="1">
+      <a:defRPr sz="1200" kern="1200">
+        <a:solidFill>
+          <a:schemeClr val="tx1"/>
+        </a:solidFill>
+        <a:latin typeface="+mn-lt"/>
+        <a:ea typeface="+mn-ea"/>
+        <a:cs typeface="+mn-cs"/>
+      </a:defRPr>
+    </a:lvl2pPr>
+    <a:lvl3pPr marL="914400" algn="l" defTabSz="914400" rtl="0" eaLnBrk="1" latinLnBrk="0" hangingPunct="1">
+      <a:defRPr sz="1200" kern="1200">
+        <a:solidFill>
+          <a:schemeClr val="tx1"/>
+        </a:solidFill>
+        <a:latin typeface="+mn-lt"/>
+        <a:ea typeface="+mn-ea"/>
+        <a:cs typeface="+mn-cs"/>
+      </a:defRPr>
+    </a:lvl3pPr>
+    <a:lvl4pPr marL="1371600" algn="l" defTabSz="914400" rtl="0" eaLnBrk="1" latinLnBrk="0" hangingPunct="1">
+      <a:defRPr sz="1200" kern="1200">
+        <a:solidFill>
+          <a:schemeClr val="tx1"/>
+        </a:solidFill>
+        <a:latin typeface="+mn-lt"/>
+        <a:ea typeface="+mn-ea"/>
+        <a:cs typeface="+mn-cs"/>
+      </a:defRPr>
+    </a:lvl4pPr>
+    <a:lvl5pPr marL="1828800" algn="l" defTabSz="914400" rtl="0" eaLnBrk="1" latinLnBrk="0" hangingPunct="1">
+      <a:defRPr sz="1200" kern="1200">
+        <a:solidFill>
+          <a:schemeClr val="tx1"/>
+        </a:solidFill>
+        <a:latin typeface="+mn-lt"/>
+        <a:ea typeface="+mn-ea"/>
+        <a:cs typeface="+mn-cs"/>
+      </a:defRPr>
+    </a:lvl5pPr>
+    <a:lvl6pPr marL="2286000" algn="l" defTabSz="914400" rtl="0" eaLnBrk="1" latinLnBrk="0" hangingPunct="1">
+      <a:defRPr sz="1200" kern="1200">
+        <a:solidFill>
+          <a:schemeClr val="tx1"/>
+        </a:solidFill>
+        <a:latin typeface="+mn-lt"/>
+        <a:ea typeface="+mn-ea"/>
+        <a:cs typeface="+mn-cs"/>
+      </a:defRPr>
+    </a:lvl6pPr>
+    <a:lvl7pPr marL="2743200" algn="l" defTabSz="914400" rtl="0" eaLnBrk="1" latinLnBrk="0" hangingPunct="1">
+      <a:defRPr sz="1200" kern="1200">
+        <a:solidFill>
+          <a:schemeClr val="tx1"/>
+        </a:solidFill>
+        <a:latin typeface="+mn-lt"/>
+        <a:ea typeface="+mn-ea"/>
+        <a:cs typeface="+mn-cs"/>
+      </a:defRPr>
+    </a:lvl7pPr>
+    <a:lvl8pPr marL="3200400" algn="l" defTabSz="914400" rtl="0" eaLnBrk="1" latinLnBrk="0" hangingPunct="1">
+      <a:defRPr sz="1200" kern="1200">
+        <a:solidFill>
+          <a:schemeClr val="tx1"/>
+        </a:solidFill>
+        <a:latin typeface="+mn-lt"/>
+        <a:ea typeface="+mn-ea"/>
+        <a:cs typeface="+mn-cs"/>
+      </a:defRPr>
+    </a:lvl8pPr>
+    <a:lvl9pPr marL="3657600" algn="l" defTabSz="914400" rtl="0" eaLnBrk="1" latinLnBrk="0" hangingPunct="1">
+      <a:defRPr sz="1200" kern="1200">
+        <a:solidFill>
+          <a:schemeClr val="tx1"/>
+        </a:solidFill>
+        <a:latin typeface="+mn-lt"/>
+        <a:ea typeface="+mn-ea"/>
+        <a:cs typeface="+mn-cs"/>
+      </a:defRPr>
+    </a:lvl9pPr>
+  </p:notesStyle>
+</p:notesMaster>
+</file>
+
+<file path=ppt/notesSlides/notesSlide1.xml><?xml version="1.0" encoding="utf-8"?>
+<p:notes xmlns:a="http://schemas.openxmlformats.org/drawingml/2006/main" xmlns:r="http://schemas.openxmlformats.org/officeDocument/2006/relationships" xmlns:p="http://schemas.openxmlformats.org/presentationml/2006/main">
+  <p:cSld>
+    <p:spTree>
+      <p:nvGrpSpPr>
+        <p:cNvPr id="1" name=""/>
+        <p:cNvGrpSpPr/>
+        <p:nvPr/>
+      </p:nvGrpSpPr>
+      <p:grpSpPr>
+        <a:xfrm>
+          <a:off x="0" y="0"/>
+          <a:ext cx="0" cy="0"/>
+          <a:chOff x="0" y="0"/>
+          <a:chExt cx="0" cy="0"/>
+        </a:xfrm>
+      </p:grpSpPr>
+      <p:sp>
+        <p:nvSpPr>
+          <p:cNvPr id="2" name="Slide Image Placeholder 1"/>
+          <p:cNvSpPr>
+            <a:spLocks noGrp="1" noRot="1" noChangeAspect="1"/>
+          </p:cNvSpPr>
+          <p:nvPr>
+            <p:ph type="sldImg"/>
+          </p:nvPr>
+        </p:nvSpPr>
+        <p:spPr/>
+      </p:sp>
+      <p:sp>
+        <p:nvSpPr>
+          <p:cNvPr id="3" name="Notes Placeholder 2"/>
+          <p:cNvSpPr>
+            <a:spLocks noGrp="1"/>
+          </p:cNvSpPr>
+          <p:nvPr>
+            <p:ph type="body" idx="1"/>
+          </p:nvPr>
+        </p:nvSpPr>
+        <p:spPr/>
+        <p:txBody>
+          <a:bodyPr/>
+          <a:lstStyle/>
+          <a:p>
+            <a:endParaRPr lang="en-US"/>
+          </a:p>
+        </p:txBody>
+      </p:sp>
+      <p:sp>
+        <p:nvSpPr>
+          <p:cNvPr id="4" name="Slide Number Placeholder 3"/>
+          <p:cNvSpPr>
+            <a:spLocks noGrp="1"/>
+          </p:cNvSpPr>
+          <p:nvPr>
+            <p:ph type="sldNum" sz="quarter" idx="10"/>
+          </p:nvPr>
+        </p:nvSpPr>
+        <p:spPr/>
+        <p:txBody>
+          <a:bodyPr/>
+          <a:lstStyle/>
+          <a:p>
+            <a:fld id="{DAFE4E38-B8CF-D14B-AFD1-14DC91F3B649}" type="slidenum">
+              <a:rPr lang="en-US" smtClean="0"/>
+              <a:t>1</a:t>
+            </a:fld>
+            <a:endParaRPr lang="en-US"/>
+          </a:p>
+        </p:txBody>
+      </p:sp>
+    </p:spTree>
+    <p:extLst>
+      <p:ext uri="{BB962C8B-B14F-4D97-AF65-F5344CB8AC3E}">
+        <p14:creationId xmlns:p14="http://schemas.microsoft.com/office/powerpoint/2010/main" val="1657113398"/>
+      </p:ext>
+    </p:extLst>
+  </p:cSld>
+  <p:clrMapOvr>
+    <a:masterClrMapping/>
+  </p:clrMapOvr>
+</p:notes>
 </file>
 
 <file path=ppt/slideLayouts/slideLayout1.xml><?xml version="1.0" encoding="utf-8"?>
@@ -5914,6 +6350,44 @@
           </a:p>
         </p:txBody>
       </p:sp>
+      <p:pic>
+        <p:nvPicPr>
+          <p:cNvPr id="8" name="Audio 7">
+            <a:hlinkClick r:id="" action="ppaction://media"/>
+            <a:extLst>
+              <a:ext uri="{FF2B5EF4-FFF2-40B4-BE49-F238E27FC236}">
+                <a16:creationId xmlns:a16="http://schemas.microsoft.com/office/drawing/2014/main" id="{FF440EF9-C2A3-D641-B2C4-3753249D9F66}"/>
+              </a:ext>
+            </a:extLst>
+          </p:cNvPr>
+          <p:cNvPicPr>
+            <a:picLocks noChangeAspect="1"/>
+          </p:cNvPicPr>
+          <p:nvPr>
+            <a:audioFile r:link="rId2"/>
+            <p:extLst>
+              <p:ext uri="{DAA4B4D4-6D71-4841-9C94-3DE7FCFB9230}">
+                <p14:media xmlns:p14="http://schemas.microsoft.com/office/powerpoint/2010/main" r:embed="rId1"/>
+              </p:ext>
+            </p:extLst>
+          </p:nvPr>
+        </p:nvPicPr>
+        <p:blipFill>
+          <a:blip r:embed="rId5"/>
+          <a:stretch>
+            <a:fillRect/>
+          </a:stretch>
+        </p:blipFill>
+        <p:spPr>
+          <a:xfrm>
+            <a:off x="11226800" y="5892800"/>
+            <a:ext cx="812800" cy="812800"/>
+          </a:xfrm>
+          <a:prstGeom prst="rect">
+            <a:avLst/>
+          </a:prstGeom>
+        </p:spPr>
+      </p:pic>
     </p:spTree>
     <p:extLst>
       <p:ext uri="{BB962C8B-B14F-4D97-AF65-F5344CB8AC3E}">
@@ -5924,6 +6398,101 @@
   <p:clrMapOvr>
     <a:masterClrMapping/>
   </p:clrMapOvr>
+  <mc:AlternateContent xmlns:mc="http://schemas.openxmlformats.org/markup-compatibility/2006">
+    <mc:Choice xmlns:p14="http://schemas.microsoft.com/office/powerpoint/2010/main" Requires="p14">
+      <p:transition spd="slow" p14:dur="2000" advTm="6095"/>
+    </mc:Choice>
+    <mc:Fallback>
+      <p:transition spd="slow" advTm="6095"/>
+    </mc:Fallback>
+  </mc:AlternateContent>
+  <p:timing>
+    <p:tnLst>
+      <p:par>
+        <p:cTn id="1" dur="indefinite" restart="never" nodeType="tmRoot">
+          <p:childTnLst>
+            <p:seq concurrent="1" nextAc="seek">
+              <p:cTn id="2" dur="indefinite" nodeType="mainSeq">
+                <p:childTnLst>
+                  <p:par>
+                    <p:cTn id="3" fill="hold">
+                      <p:stCondLst>
+                        <p:cond delay="indefinite"/>
+                        <p:cond evt="onBegin" delay="0">
+                          <p:tn val="2"/>
+                        </p:cond>
+                      </p:stCondLst>
+                      <p:childTnLst>
+                        <p:par>
+                          <p:cTn id="4" fill="hold">
+                            <p:stCondLst>
+                              <p:cond delay="0"/>
+                            </p:stCondLst>
+                            <p:childTnLst>
+                              <p:par>
+                                <p:cTn id="5" presetID="1" presetClass="mediacall" presetSubtype="0" fill="hold" nodeType="afterEffect">
+                                  <p:stCondLst>
+                                    <p:cond delay="0"/>
+                                  </p:stCondLst>
+                                  <p:childTnLst>
+                                    <p:cmd type="call" cmd="playFrom(0.0)">
+                                      <p:cBhvr>
+                                        <p:cTn id="6" dur="1" fill="hold"/>
+                                        <p:tgtEl>
+                                          <p:spTgt spid="8"/>
+                                        </p:tgtEl>
+                                      </p:cBhvr>
+                                    </p:cmd>
+                                  </p:childTnLst>
+                                </p:cTn>
+                              </p:par>
+                            </p:childTnLst>
+                          </p:cTn>
+                        </p:par>
+                      </p:childTnLst>
+                    </p:cTn>
+                  </p:par>
+                </p:childTnLst>
+              </p:cTn>
+              <p:prevCondLst>
+                <p:cond evt="onPrev" delay="0">
+                  <p:tgtEl>
+                    <p:sldTgt/>
+                  </p:tgtEl>
+                </p:cond>
+              </p:prevCondLst>
+              <p:nextCondLst>
+                <p:cond evt="onNext" delay="0">
+                  <p:tgtEl>
+                    <p:sldTgt/>
+                  </p:tgtEl>
+                </p:cond>
+              </p:nextCondLst>
+            </p:seq>
+            <p:audio isNarration="1">
+              <p:cMediaNode vol="80000" showWhenStopped="0">
+                <p:cTn id="7" fill="hold" display="0">
+                  <p:stCondLst>
+                    <p:cond delay="indefinite"/>
+                  </p:stCondLst>
+                  <p:endCondLst>
+                    <p:cond evt="onStopAudio" delay="0">
+                      <p:tgtEl>
+                        <p:sldTgt/>
+                      </p:tgtEl>
+                    </p:cond>
+                  </p:endCondLst>
+                </p:cTn>
+                <p:tgtEl>
+                  <p:spTgt spid="8"/>
+                </p:tgtEl>
+              </p:cMediaNode>
+            </p:audio>
+          </p:childTnLst>
+        </p:cTn>
+      </p:par>
+    </p:tnLst>
+  </p:timing>
 </p:sld>
 </file>
 
@@ -6047,6 +6616,44 @@
           </a:p>
         </p:txBody>
       </p:sp>
+      <p:pic>
+        <p:nvPicPr>
+          <p:cNvPr id="11" name="Audio 10">
+            <a:hlinkClick r:id="" action="ppaction://media"/>
+            <a:extLst>
+              <a:ext uri="{FF2B5EF4-FFF2-40B4-BE49-F238E27FC236}">
+                <a16:creationId xmlns:a16="http://schemas.microsoft.com/office/drawing/2014/main" id="{85B82D8C-71AB-5345-8393-2B388669975B}"/>
+              </a:ext>
+            </a:extLst>
+          </p:cNvPr>
+          <p:cNvPicPr>
+            <a:picLocks noChangeAspect="1"/>
+          </p:cNvPicPr>
+          <p:nvPr>
+            <a:audioFile r:link="rId2"/>
+            <p:extLst>
+              <p:ext uri="{DAA4B4D4-6D71-4841-9C94-3DE7FCFB9230}">
+                <p14:media xmlns:p14="http://schemas.microsoft.com/office/powerpoint/2010/main" r:embed="rId1"/>
+              </p:ext>
+            </p:extLst>
+          </p:nvPr>
+        </p:nvPicPr>
+        <p:blipFill>
+          <a:blip r:embed="rId4"/>
+          <a:stretch>
+            <a:fillRect/>
+          </a:stretch>
+        </p:blipFill>
+        <p:spPr>
+          <a:xfrm>
+            <a:off x="11226800" y="5892800"/>
+            <a:ext cx="812800" cy="812800"/>
+          </a:xfrm>
+          <a:prstGeom prst="rect">
+            <a:avLst/>
+          </a:prstGeom>
+        </p:spPr>
+      </p:pic>
     </p:spTree>
     <p:extLst>
       <p:ext uri="{BB962C8B-B14F-4D97-AF65-F5344CB8AC3E}">
@@ -6057,6 +6664,101 @@
   <p:clrMapOvr>
     <a:masterClrMapping/>
   </p:clrMapOvr>
+  <mc:AlternateContent xmlns:mc="http://schemas.openxmlformats.org/markup-compatibility/2006">
+    <mc:Choice xmlns:p14="http://schemas.microsoft.com/office/powerpoint/2010/main" Requires="p14">
+      <p:transition spd="slow" p14:dur="2000" advTm="6287"/>
+    </mc:Choice>
+    <mc:Fallback>
+      <p:transition spd="slow" advTm="6287"/>
+    </mc:Fallback>
+  </mc:AlternateContent>
+  <p:timing>
+    <p:tnLst>
+      <p:par>
+        <p:cTn id="1" dur="indefinite" restart="never" nodeType="tmRoot">
+          <p:childTnLst>
+            <p:seq concurrent="1" nextAc="seek">
+              <p:cTn id="2" dur="indefinite" nodeType="mainSeq">
+                <p:childTnLst>
+                  <p:par>
+                    <p:cTn id="3" fill="hold">
+                      <p:stCondLst>
+                        <p:cond delay="indefinite"/>
+                        <p:cond evt="onBegin" delay="0">
+                          <p:tn val="2"/>
+                        </p:cond>
+                      </p:stCondLst>
+                      <p:childTnLst>
+                        <p:par>
+                          <p:cTn id="4" fill="hold">
+                            <p:stCondLst>
+                              <p:cond delay="0"/>
+                            </p:stCondLst>
+                            <p:childTnLst>
+                              <p:par>
+                                <p:cTn id="5" presetID="1" presetClass="mediacall" presetSubtype="0" fill="hold" nodeType="afterEffect">
+                                  <p:stCondLst>
+                                    <p:cond delay="0"/>
+                                  </p:stCondLst>
+                                  <p:childTnLst>
+                                    <p:cmd type="call" cmd="playFrom(0.0)">
+                                      <p:cBhvr>
+                                        <p:cTn id="6" dur="1" fill="hold"/>
+                                        <p:tgtEl>
+                                          <p:spTgt spid="11"/>
+                                        </p:tgtEl>
+                                      </p:cBhvr>
+                                    </p:cmd>
+                                  </p:childTnLst>
+                                </p:cTn>
+                              </p:par>
+                            </p:childTnLst>
+                          </p:cTn>
+                        </p:par>
+                      </p:childTnLst>
+                    </p:cTn>
+                  </p:par>
+                </p:childTnLst>
+              </p:cTn>
+              <p:prevCondLst>
+                <p:cond evt="onPrev" delay="0">
+                  <p:tgtEl>
+                    <p:sldTgt/>
+                  </p:tgtEl>
+                </p:cond>
+              </p:prevCondLst>
+              <p:nextCondLst>
+                <p:cond evt="onNext" delay="0">
+                  <p:tgtEl>
+                    <p:sldTgt/>
+                  </p:tgtEl>
+                </p:cond>
+              </p:nextCondLst>
+            </p:seq>
+            <p:audio isNarration="1">
+              <p:cMediaNode vol="80000" showWhenStopped="0">
+                <p:cTn id="7" fill="hold" display="0">
+                  <p:stCondLst>
+                    <p:cond delay="indefinite"/>
+                  </p:stCondLst>
+                  <p:endCondLst>
+                    <p:cond evt="onStopAudio" delay="0">
+                      <p:tgtEl>
+                        <p:sldTgt/>
+                      </p:tgtEl>
+                    </p:cond>
+                  </p:endCondLst>
+                </p:cTn>
+                <p:tgtEl>
+                  <p:spTgt spid="11"/>
+                </p:tgtEl>
+              </p:cMediaNode>
+            </p:audio>
+          </p:childTnLst>
+        </p:cTn>
+      </p:par>
+    </p:tnLst>
+  </p:timing>
 </p:sld>
 </file>
 
@@ -6194,6 +6896,44 @@
           </a:p>
         </p:txBody>
       </p:sp>
+      <p:pic>
+        <p:nvPicPr>
+          <p:cNvPr id="8" name="Audio 7">
+            <a:hlinkClick r:id="" action="ppaction://media"/>
+            <a:extLst>
+              <a:ext uri="{FF2B5EF4-FFF2-40B4-BE49-F238E27FC236}">
+                <a16:creationId xmlns:a16="http://schemas.microsoft.com/office/drawing/2014/main" id="{197E51DB-64D0-E340-8A1E-ABC8EEEC4B5C}"/>
+              </a:ext>
+            </a:extLst>
+          </p:cNvPr>
+          <p:cNvPicPr>
+            <a:picLocks noChangeAspect="1"/>
+          </p:cNvPicPr>
+          <p:nvPr>
+            <a:audioFile r:link="rId2"/>
+            <p:extLst>
+              <p:ext uri="{DAA4B4D4-6D71-4841-9C94-3DE7FCFB9230}">
+                <p14:media xmlns:p14="http://schemas.microsoft.com/office/powerpoint/2010/main" r:embed="rId1"/>
+              </p:ext>
+            </p:extLst>
+          </p:nvPr>
+        </p:nvPicPr>
+        <p:blipFill>
+          <a:blip r:embed="rId4"/>
+          <a:stretch>
+            <a:fillRect/>
+          </a:stretch>
+        </p:blipFill>
+        <p:spPr>
+          <a:xfrm>
+            <a:off x="11226800" y="5892800"/>
+            <a:ext cx="812800" cy="812800"/>
+          </a:xfrm>
+          <a:prstGeom prst="rect">
+            <a:avLst/>
+          </a:prstGeom>
+        </p:spPr>
+      </p:pic>
     </p:spTree>
     <p:extLst>
       <p:ext uri="{BB962C8B-B14F-4D97-AF65-F5344CB8AC3E}">
@@ -6204,6 +6944,101 @@
   <p:clrMapOvr>
     <a:masterClrMapping/>
   </p:clrMapOvr>
+  <mc:AlternateContent xmlns:mc="http://schemas.openxmlformats.org/markup-compatibility/2006">
+    <mc:Choice xmlns:p14="http://schemas.microsoft.com/office/powerpoint/2010/main" Requires="p14">
+      <p:transition spd="slow" p14:dur="2000" advTm="4615"/>
+    </mc:Choice>
+    <mc:Fallback>
+      <p:transition spd="slow" advTm="4615"/>
+    </mc:Fallback>
+  </mc:AlternateContent>
+  <p:timing>
+    <p:tnLst>
+      <p:par>
+        <p:cTn id="1" dur="indefinite" restart="never" nodeType="tmRoot">
+          <p:childTnLst>
+            <p:seq concurrent="1" nextAc="seek">
+              <p:cTn id="2" dur="indefinite" nodeType="mainSeq">
+                <p:childTnLst>
+                  <p:par>
+                    <p:cTn id="3" fill="hold">
+                      <p:stCondLst>
+                        <p:cond delay="indefinite"/>
+                        <p:cond evt="onBegin" delay="0">
+                          <p:tn val="2"/>
+                        </p:cond>
+                      </p:stCondLst>
+                      <p:childTnLst>
+                        <p:par>
+                          <p:cTn id="4" fill="hold">
+                            <p:stCondLst>
+                              <p:cond delay="0"/>
+                            </p:stCondLst>
+                            <p:childTnLst>
+                              <p:par>
+                                <p:cTn id="5" presetID="1" presetClass="mediacall" presetSubtype="0" fill="hold" nodeType="afterEffect">
+                                  <p:stCondLst>
+                                    <p:cond delay="0"/>
+                                  </p:stCondLst>
+                                  <p:childTnLst>
+                                    <p:cmd type="call" cmd="playFrom(0.0)">
+                                      <p:cBhvr>
+                                        <p:cTn id="6" dur="1" fill="hold"/>
+                                        <p:tgtEl>
+                                          <p:spTgt spid="8"/>
+                                        </p:tgtEl>
+                                      </p:cBhvr>
+                                    </p:cmd>
+                                  </p:childTnLst>
+                                </p:cTn>
+                              </p:par>
+                            </p:childTnLst>
+                          </p:cTn>
+                        </p:par>
+                      </p:childTnLst>
+                    </p:cTn>
+                  </p:par>
+                </p:childTnLst>
+              </p:cTn>
+              <p:prevCondLst>
+                <p:cond evt="onPrev" delay="0">
+                  <p:tgtEl>
+                    <p:sldTgt/>
+                  </p:tgtEl>
+                </p:cond>
+              </p:prevCondLst>
+              <p:nextCondLst>
+                <p:cond evt="onNext" delay="0">
+                  <p:tgtEl>
+                    <p:sldTgt/>
+                  </p:tgtEl>
+                </p:cond>
+              </p:nextCondLst>
+            </p:seq>
+            <p:audio isNarration="1">
+              <p:cMediaNode vol="80000" showWhenStopped="0">
+                <p:cTn id="7" fill="hold" display="0">
+                  <p:stCondLst>
+                    <p:cond delay="indefinite"/>
+                  </p:stCondLst>
+                  <p:endCondLst>
+                    <p:cond evt="onStopAudio" delay="0">
+                      <p:tgtEl>
+                        <p:sldTgt/>
+                      </p:tgtEl>
+                    </p:cond>
+                  </p:endCondLst>
+                </p:cTn>
+                <p:tgtEl>
+                  <p:spTgt spid="8"/>
+                </p:tgtEl>
+              </p:cMediaNode>
+            </p:audio>
+          </p:childTnLst>
+        </p:cTn>
+      </p:par>
+    </p:tnLst>
+  </p:timing>
 </p:sld>
 </file>
 
@@ -6315,6 +7150,44 @@
           </a:p>
         </p:txBody>
       </p:sp>
+      <p:pic>
+        <p:nvPicPr>
+          <p:cNvPr id="5" name="Audio 4">
+            <a:hlinkClick r:id="" action="ppaction://media"/>
+            <a:extLst>
+              <a:ext uri="{FF2B5EF4-FFF2-40B4-BE49-F238E27FC236}">
+                <a16:creationId xmlns:a16="http://schemas.microsoft.com/office/drawing/2014/main" id="{4A3873AE-9640-974D-8693-AD522A64AEDC}"/>
+              </a:ext>
+            </a:extLst>
+          </p:cNvPr>
+          <p:cNvPicPr>
+            <a:picLocks noChangeAspect="1"/>
+          </p:cNvPicPr>
+          <p:nvPr>
+            <a:audioFile r:link="rId2"/>
+            <p:extLst>
+              <p:ext uri="{DAA4B4D4-6D71-4841-9C94-3DE7FCFB9230}">
+                <p14:media xmlns:p14="http://schemas.microsoft.com/office/powerpoint/2010/main" r:embed="rId1"/>
+              </p:ext>
+            </p:extLst>
+          </p:nvPr>
+        </p:nvPicPr>
+        <p:blipFill>
+          <a:blip r:embed="rId4"/>
+          <a:stretch>
+            <a:fillRect/>
+          </a:stretch>
+        </p:blipFill>
+        <p:spPr>
+          <a:xfrm>
+            <a:off x="11226800" y="5892800"/>
+            <a:ext cx="812800" cy="812800"/>
+          </a:xfrm>
+          <a:prstGeom prst="rect">
+            <a:avLst/>
+          </a:prstGeom>
+        </p:spPr>
+      </p:pic>
     </p:spTree>
     <p:extLst>
       <p:ext uri="{BB962C8B-B14F-4D97-AF65-F5344CB8AC3E}">
@@ -6325,6 +7198,101 @@
   <p:clrMapOvr>
     <a:masterClrMapping/>
   </p:clrMapOvr>
+  <mc:AlternateContent xmlns:mc="http://schemas.openxmlformats.org/markup-compatibility/2006">
+    <mc:Choice xmlns:p14="http://schemas.microsoft.com/office/powerpoint/2010/main" Requires="p14">
+      <p:transition spd="slow" p14:dur="2000" advTm="4483"/>
+    </mc:Choice>
+    <mc:Fallback>
+      <p:transition spd="slow" advTm="4483"/>
+    </mc:Fallback>
+  </mc:AlternateContent>
+  <p:timing>
+    <p:tnLst>
+      <p:par>
+        <p:cTn id="1" dur="indefinite" restart="never" nodeType="tmRoot">
+          <p:childTnLst>
+            <p:seq concurrent="1" nextAc="seek">
+              <p:cTn id="2" dur="indefinite" nodeType="mainSeq">
+                <p:childTnLst>
+                  <p:par>
+                    <p:cTn id="3" fill="hold">
+                      <p:stCondLst>
+                        <p:cond delay="indefinite"/>
+                        <p:cond evt="onBegin" delay="0">
+                          <p:tn val="2"/>
+                        </p:cond>
+                      </p:stCondLst>
+                      <p:childTnLst>
+                        <p:par>
+                          <p:cTn id="4" fill="hold">
+                            <p:stCondLst>
+                              <p:cond delay="0"/>
+                            </p:stCondLst>
+                            <p:childTnLst>
+                              <p:par>
+                                <p:cTn id="5" presetID="1" presetClass="mediacall" presetSubtype="0" fill="hold" nodeType="afterEffect">
+                                  <p:stCondLst>
+                                    <p:cond delay="0"/>
+                                  </p:stCondLst>
+                                  <p:childTnLst>
+                                    <p:cmd type="call" cmd="playFrom(0.0)">
+                                      <p:cBhvr>
+                                        <p:cTn id="6" dur="1" fill="hold"/>
+                                        <p:tgtEl>
+                                          <p:spTgt spid="5"/>
+                                        </p:tgtEl>
+                                      </p:cBhvr>
+                                    </p:cmd>
+                                  </p:childTnLst>
+                                </p:cTn>
+                              </p:par>
+                            </p:childTnLst>
+                          </p:cTn>
+                        </p:par>
+                      </p:childTnLst>
+                    </p:cTn>
+                  </p:par>
+                </p:childTnLst>
+              </p:cTn>
+              <p:prevCondLst>
+                <p:cond evt="onPrev" delay="0">
+                  <p:tgtEl>
+                    <p:sldTgt/>
+                  </p:tgtEl>
+                </p:cond>
+              </p:prevCondLst>
+              <p:nextCondLst>
+                <p:cond evt="onNext" delay="0">
+                  <p:tgtEl>
+                    <p:sldTgt/>
+                  </p:tgtEl>
+                </p:cond>
+              </p:nextCondLst>
+            </p:seq>
+            <p:audio isNarration="1">
+              <p:cMediaNode vol="80000" showWhenStopped="0">
+                <p:cTn id="7" fill="hold" display="0">
+                  <p:stCondLst>
+                    <p:cond delay="indefinite"/>
+                  </p:stCondLst>
+                  <p:endCondLst>
+                    <p:cond evt="onStopAudio" delay="0">
+                      <p:tgtEl>
+                        <p:sldTgt/>
+                      </p:tgtEl>
+                    </p:cond>
+                  </p:endCondLst>
+                </p:cTn>
+                <p:tgtEl>
+                  <p:spTgt spid="5"/>
+                </p:tgtEl>
+              </p:cMediaNode>
+            </p:audio>
+          </p:childTnLst>
+        </p:cTn>
+      </p:par>
+    </p:tnLst>
+  </p:timing>
 </p:sld>
 </file>
 
@@ -6410,7 +7378,7 @@
             </a:r>
             <a:r>
               <a:rPr lang="en-US" dirty="0">
-                <a:hlinkClick r:id="rId2"/>
+                <a:hlinkClick r:id="rId4"/>
               </a:rPr>
               <a:t>http://www.misalignedtech.com/</a:t>
             </a:r>
@@ -6436,6 +7404,44 @@
           </a:p>
         </p:txBody>
       </p:sp>
+      <p:pic>
+        <p:nvPicPr>
+          <p:cNvPr id="4" name="Audio 3">
+            <a:hlinkClick r:id="" action="ppaction://media"/>
+            <a:extLst>
+              <a:ext uri="{FF2B5EF4-FFF2-40B4-BE49-F238E27FC236}">
+                <a16:creationId xmlns:a16="http://schemas.microsoft.com/office/drawing/2014/main" id="{ECAEBC41-2553-9742-8651-4ACE8CB8C98C}"/>
+              </a:ext>
+            </a:extLst>
+          </p:cNvPr>
+          <p:cNvPicPr>
+            <a:picLocks noChangeAspect="1"/>
+          </p:cNvPicPr>
+          <p:nvPr>
+            <a:audioFile r:link="rId2"/>
+            <p:extLst>
+              <p:ext uri="{DAA4B4D4-6D71-4841-9C94-3DE7FCFB9230}">
+                <p14:media xmlns:p14="http://schemas.microsoft.com/office/powerpoint/2010/main" r:embed="rId1"/>
+              </p:ext>
+            </p:extLst>
+          </p:nvPr>
+        </p:nvPicPr>
+        <p:blipFill>
+          <a:blip r:embed="rId5"/>
+          <a:stretch>
+            <a:fillRect/>
+          </a:stretch>
+        </p:blipFill>
+        <p:spPr>
+          <a:xfrm>
+            <a:off x="11226800" y="5892800"/>
+            <a:ext cx="812800" cy="812800"/>
+          </a:xfrm>
+          <a:prstGeom prst="rect">
+            <a:avLst/>
+          </a:prstGeom>
+        </p:spPr>
+      </p:pic>
     </p:spTree>
     <p:extLst>
       <p:ext uri="{BB962C8B-B14F-4D97-AF65-F5344CB8AC3E}">
@@ -6446,6 +7452,101 @@
   <p:clrMapOvr>
     <a:masterClrMapping/>
   </p:clrMapOvr>
+  <mc:AlternateContent xmlns:mc="http://schemas.openxmlformats.org/markup-compatibility/2006">
+    <mc:Choice xmlns:p14="http://schemas.microsoft.com/office/powerpoint/2010/main" Requires="p14">
+      <p:transition spd="slow" p14:dur="2000" advTm="5457"/>
+    </mc:Choice>
+    <mc:Fallback>
+      <p:transition spd="slow" advTm="5457"/>
+    </mc:Fallback>
+  </mc:AlternateContent>
+  <p:timing>
+    <p:tnLst>
+      <p:par>
+        <p:cTn id="1" dur="indefinite" restart="never" nodeType="tmRoot">
+          <p:childTnLst>
+            <p:seq concurrent="1" nextAc="seek">
+              <p:cTn id="2" dur="indefinite" nodeType="mainSeq">
+                <p:childTnLst>
+                  <p:par>
+                    <p:cTn id="3" fill="hold">
+                      <p:stCondLst>
+                        <p:cond delay="indefinite"/>
+                        <p:cond evt="onBegin" delay="0">
+                          <p:tn val="2"/>
+                        </p:cond>
+                      </p:stCondLst>
+                      <p:childTnLst>
+                        <p:par>
+                          <p:cTn id="4" fill="hold">
+                            <p:stCondLst>
+                              <p:cond delay="0"/>
+                            </p:stCondLst>
+                            <p:childTnLst>
+                              <p:par>
+                                <p:cTn id="5" presetID="1" presetClass="mediacall" presetSubtype="0" fill="hold" nodeType="afterEffect">
+                                  <p:stCondLst>
+                                    <p:cond delay="0"/>
+                                  </p:stCondLst>
+                                  <p:childTnLst>
+                                    <p:cmd type="call" cmd="playFrom(0.0)">
+                                      <p:cBhvr>
+                                        <p:cTn id="6" dur="1" fill="hold"/>
+                                        <p:tgtEl>
+                                          <p:spTgt spid="4"/>
+                                        </p:tgtEl>
+                                      </p:cBhvr>
+                                    </p:cmd>
+                                  </p:childTnLst>
+                                </p:cTn>
+                              </p:par>
+                            </p:childTnLst>
+                          </p:cTn>
+                        </p:par>
+                      </p:childTnLst>
+                    </p:cTn>
+                  </p:par>
+                </p:childTnLst>
+              </p:cTn>
+              <p:prevCondLst>
+                <p:cond evt="onPrev" delay="0">
+                  <p:tgtEl>
+                    <p:sldTgt/>
+                  </p:tgtEl>
+                </p:cond>
+              </p:prevCondLst>
+              <p:nextCondLst>
+                <p:cond evt="onNext" delay="0">
+                  <p:tgtEl>
+                    <p:sldTgt/>
+                  </p:tgtEl>
+                </p:cond>
+              </p:nextCondLst>
+            </p:seq>
+            <p:audio isNarration="1">
+              <p:cMediaNode vol="80000" showWhenStopped="0">
+                <p:cTn id="7" fill="hold" display="0">
+                  <p:stCondLst>
+                    <p:cond delay="indefinite"/>
+                  </p:stCondLst>
+                  <p:endCondLst>
+                    <p:cond evt="onStopAudio" delay="0">
+                      <p:tgtEl>
+                        <p:sldTgt/>
+                      </p:tgtEl>
+                    </p:cond>
+                  </p:endCondLst>
+                </p:cTn>
+                <p:tgtEl>
+                  <p:spTgt spid="4"/>
+                </p:tgtEl>
+              </p:cMediaNode>
+            </p:audio>
+          </p:childTnLst>
+        </p:cTn>
+      </p:par>
+    </p:tnLst>
+  </p:timing>
 </p:sld>
 </file>
 
@@ -6502,6 +7603,44 @@
           </a:p>
         </p:txBody>
       </p:sp>
+      <p:pic>
+        <p:nvPicPr>
+          <p:cNvPr id="5" name="Audio 4">
+            <a:hlinkClick r:id="" action="ppaction://media"/>
+            <a:extLst>
+              <a:ext uri="{FF2B5EF4-FFF2-40B4-BE49-F238E27FC236}">
+                <a16:creationId xmlns:a16="http://schemas.microsoft.com/office/drawing/2014/main" id="{AF2FDC3B-7CAC-8B4F-B395-513AA2CED3F8}"/>
+              </a:ext>
+            </a:extLst>
+          </p:cNvPr>
+          <p:cNvPicPr>
+            <a:picLocks noChangeAspect="1"/>
+          </p:cNvPicPr>
+          <p:nvPr>
+            <a:audioFile r:link="rId2"/>
+            <p:extLst>
+              <p:ext uri="{DAA4B4D4-6D71-4841-9C94-3DE7FCFB9230}">
+                <p14:media xmlns:p14="http://schemas.microsoft.com/office/powerpoint/2010/main" r:embed="rId1"/>
+              </p:ext>
+            </p:extLst>
+          </p:nvPr>
+        </p:nvPicPr>
+        <p:blipFill>
+          <a:blip r:embed="rId4"/>
+          <a:stretch>
+            <a:fillRect/>
+          </a:stretch>
+        </p:blipFill>
+        <p:spPr>
+          <a:xfrm>
+            <a:off x="11226800" y="5892800"/>
+            <a:ext cx="812800" cy="812800"/>
+          </a:xfrm>
+          <a:prstGeom prst="rect">
+            <a:avLst/>
+          </a:prstGeom>
+        </p:spPr>
+      </p:pic>
     </p:spTree>
     <p:extLst>
       <p:ext uri="{BB962C8B-B14F-4D97-AF65-F5344CB8AC3E}">
@@ -6512,6 +7651,101 @@
   <p:clrMapOvr>
     <a:masterClrMapping/>
   </p:clrMapOvr>
+  <mc:AlternateContent xmlns:mc="http://schemas.openxmlformats.org/markup-compatibility/2006">
+    <mc:Choice xmlns:p14="http://schemas.microsoft.com/office/powerpoint/2010/main" Requires="p14">
+      <p:transition spd="slow" p14:dur="2000" advTm="5273"/>
+    </mc:Choice>
+    <mc:Fallback>
+      <p:transition spd="slow" advTm="5273"/>
+    </mc:Fallback>
+  </mc:AlternateContent>
+  <p:timing>
+    <p:tnLst>
+      <p:par>
+        <p:cTn id="1" dur="indefinite" restart="never" nodeType="tmRoot">
+          <p:childTnLst>
+            <p:seq concurrent="1" nextAc="seek">
+              <p:cTn id="2" dur="indefinite" nodeType="mainSeq">
+                <p:childTnLst>
+                  <p:par>
+                    <p:cTn id="3" fill="hold">
+                      <p:stCondLst>
+                        <p:cond delay="indefinite"/>
+                        <p:cond evt="onBegin" delay="0">
+                          <p:tn val="2"/>
+                        </p:cond>
+                      </p:stCondLst>
+                      <p:childTnLst>
+                        <p:par>
+                          <p:cTn id="4" fill="hold">
+                            <p:stCondLst>
+                              <p:cond delay="0"/>
+                            </p:stCondLst>
+                            <p:childTnLst>
+                              <p:par>
+                                <p:cTn id="5" presetID="1" presetClass="mediacall" presetSubtype="0" fill="hold" nodeType="afterEffect">
+                                  <p:stCondLst>
+                                    <p:cond delay="0"/>
+                                  </p:stCondLst>
+                                  <p:childTnLst>
+                                    <p:cmd type="call" cmd="playFrom(0.0)">
+                                      <p:cBhvr>
+                                        <p:cTn id="6" dur="1" fill="hold"/>
+                                        <p:tgtEl>
+                                          <p:spTgt spid="5"/>
+                                        </p:tgtEl>
+                                      </p:cBhvr>
+                                    </p:cmd>
+                                  </p:childTnLst>
+                                </p:cTn>
+                              </p:par>
+                            </p:childTnLst>
+                          </p:cTn>
+                        </p:par>
+                      </p:childTnLst>
+                    </p:cTn>
+                  </p:par>
+                </p:childTnLst>
+              </p:cTn>
+              <p:prevCondLst>
+                <p:cond evt="onPrev" delay="0">
+                  <p:tgtEl>
+                    <p:sldTgt/>
+                  </p:tgtEl>
+                </p:cond>
+              </p:prevCondLst>
+              <p:nextCondLst>
+                <p:cond evt="onNext" delay="0">
+                  <p:tgtEl>
+                    <p:sldTgt/>
+                  </p:tgtEl>
+                </p:cond>
+              </p:nextCondLst>
+            </p:seq>
+            <p:audio isNarration="1">
+              <p:cMediaNode vol="80000" showWhenStopped="0">
+                <p:cTn id="7" fill="hold" display="0">
+                  <p:stCondLst>
+                    <p:cond delay="indefinite"/>
+                  </p:stCondLst>
+                  <p:endCondLst>
+                    <p:cond evt="onStopAudio" delay="0">
+                      <p:tgtEl>
+                        <p:sldTgt/>
+                      </p:tgtEl>
+                    </p:cond>
+                  </p:endCondLst>
+                </p:cTn>
+                <p:tgtEl>
+                  <p:spTgt spid="5"/>
+                </p:tgtEl>
+              </p:cMediaNode>
+            </p:audio>
+          </p:childTnLst>
+        </p:cTn>
+      </p:par>
+    </p:tnLst>
+  </p:timing>
 </p:sld>
 </file>
 
@@ -6590,6 +7824,44 @@
           </a:p>
         </p:txBody>
       </p:sp>
+      <p:pic>
+        <p:nvPicPr>
+          <p:cNvPr id="4" name="Audio 3">
+            <a:hlinkClick r:id="" action="ppaction://media"/>
+            <a:extLst>
+              <a:ext uri="{FF2B5EF4-FFF2-40B4-BE49-F238E27FC236}">
+                <a16:creationId xmlns:a16="http://schemas.microsoft.com/office/drawing/2014/main" id="{5F9D98F5-BB43-B646-9783-77B77A79F3E2}"/>
+              </a:ext>
+            </a:extLst>
+          </p:cNvPr>
+          <p:cNvPicPr>
+            <a:picLocks noChangeAspect="1"/>
+          </p:cNvPicPr>
+          <p:nvPr>
+            <a:audioFile r:link="rId2"/>
+            <p:extLst>
+              <p:ext uri="{DAA4B4D4-6D71-4841-9C94-3DE7FCFB9230}">
+                <p14:media xmlns:p14="http://schemas.microsoft.com/office/powerpoint/2010/main" r:embed="rId1"/>
+              </p:ext>
+            </p:extLst>
+          </p:nvPr>
+        </p:nvPicPr>
+        <p:blipFill>
+          <a:blip r:embed="rId4"/>
+          <a:stretch>
+            <a:fillRect/>
+          </a:stretch>
+        </p:blipFill>
+        <p:spPr>
+          <a:xfrm>
+            <a:off x="11226800" y="5892800"/>
+            <a:ext cx="812800" cy="812800"/>
+          </a:xfrm>
+          <a:prstGeom prst="rect">
+            <a:avLst/>
+          </a:prstGeom>
+        </p:spPr>
+      </p:pic>
     </p:spTree>
     <p:extLst>
       <p:ext uri="{BB962C8B-B14F-4D97-AF65-F5344CB8AC3E}">
@@ -6600,6 +7872,101 @@
   <p:clrMapOvr>
     <a:masterClrMapping/>
   </p:clrMapOvr>
+  <mc:AlternateContent xmlns:mc="http://schemas.openxmlformats.org/markup-compatibility/2006">
+    <mc:Choice xmlns:p14="http://schemas.microsoft.com/office/powerpoint/2010/main" Requires="p14">
+      <p:transition spd="slow" p14:dur="2000" advTm="2178"/>
+    </mc:Choice>
+    <mc:Fallback>
+      <p:transition spd="slow" advTm="2178"/>
+    </mc:Fallback>
+  </mc:AlternateContent>
+  <p:timing>
+    <p:tnLst>
+      <p:par>
+        <p:cTn id="1" dur="indefinite" restart="never" nodeType="tmRoot">
+          <p:childTnLst>
+            <p:seq concurrent="1" nextAc="seek">
+              <p:cTn id="2" dur="indefinite" nodeType="mainSeq">
+                <p:childTnLst>
+                  <p:par>
+                    <p:cTn id="3" fill="hold">
+                      <p:stCondLst>
+                        <p:cond delay="indefinite"/>
+                        <p:cond evt="onBegin" delay="0">
+                          <p:tn val="2"/>
+                        </p:cond>
+                      </p:stCondLst>
+                      <p:childTnLst>
+                        <p:par>
+                          <p:cTn id="4" fill="hold">
+                            <p:stCondLst>
+                              <p:cond delay="0"/>
+                            </p:stCondLst>
+                            <p:childTnLst>
+                              <p:par>
+                                <p:cTn id="5" presetID="1" presetClass="mediacall" presetSubtype="0" fill="hold" nodeType="afterEffect">
+                                  <p:stCondLst>
+                                    <p:cond delay="0"/>
+                                  </p:stCondLst>
+                                  <p:childTnLst>
+                                    <p:cmd type="call" cmd="playFrom(0.0)">
+                                      <p:cBhvr>
+                                        <p:cTn id="6" dur="1" fill="hold"/>
+                                        <p:tgtEl>
+                                          <p:spTgt spid="4"/>
+                                        </p:tgtEl>
+                                      </p:cBhvr>
+                                    </p:cmd>
+                                  </p:childTnLst>
+                                </p:cTn>
+                              </p:par>
+                            </p:childTnLst>
+                          </p:cTn>
+                        </p:par>
+                      </p:childTnLst>
+                    </p:cTn>
+                  </p:par>
+                </p:childTnLst>
+              </p:cTn>
+              <p:prevCondLst>
+                <p:cond evt="onPrev" delay="0">
+                  <p:tgtEl>
+                    <p:sldTgt/>
+                  </p:tgtEl>
+                </p:cond>
+              </p:prevCondLst>
+              <p:nextCondLst>
+                <p:cond evt="onNext" delay="0">
+                  <p:tgtEl>
+                    <p:sldTgt/>
+                  </p:tgtEl>
+                </p:cond>
+              </p:nextCondLst>
+            </p:seq>
+            <p:audio isNarration="1">
+              <p:cMediaNode vol="80000" showWhenStopped="0">
+                <p:cTn id="7" fill="hold" display="0">
+                  <p:stCondLst>
+                    <p:cond delay="indefinite"/>
+                  </p:stCondLst>
+                  <p:endCondLst>
+                    <p:cond evt="onStopAudio" delay="0">
+                      <p:tgtEl>
+                        <p:sldTgt/>
+                      </p:tgtEl>
+                    </p:cond>
+                  </p:endCondLst>
+                </p:cTn>
+                <p:tgtEl>
+                  <p:spTgt spid="4"/>
+                </p:tgtEl>
+              </p:cMediaNode>
+            </p:audio>
+          </p:childTnLst>
+        </p:cTn>
+      </p:par>
+    </p:tnLst>
+  </p:timing>
 </p:sld>
 </file>
 
@@ -6693,6 +8060,14 @@
   <p:clrMapOvr>
     <a:masterClrMapping/>
   </p:clrMapOvr>
+  <mc:AlternateContent xmlns:mc="http://schemas.openxmlformats.org/markup-compatibility/2006" xmlns:p14="http://schemas.microsoft.com/office/powerpoint/2010/main">
+    <mc:Choice Requires="p14">
+      <p:transition spd="slow" p14:dur="2000" advTm="9861"/>
+    </mc:Choice>
+    <mc:Fallback xmlns="">
+      <p:transition spd="slow" advTm="9861"/>
+    </mc:Fallback>
+  </mc:AlternateContent>
 </p:sld>
 </file>
 
@@ -6943,4 +8318,299 @@
     </a:ext>
   </a:extLst>
 </a:theme>
+</file>
+
+<file path=ppt/theme/theme2.xml><?xml version="1.0" encoding="utf-8"?>
+<a:theme xmlns:a="http://schemas.openxmlformats.org/drawingml/2006/main" name="Office Theme">
+  <a:themeElements>
+    <a:clrScheme name="Office">
+      <a:dk1>
+        <a:sysClr val="windowText" lastClr="000000"/>
+      </a:dk1>
+      <a:lt1>
+        <a:sysClr val="window" lastClr="FFFFFF"/>
+      </a:lt1>
+      <a:dk2>
+        <a:srgbClr val="44546A"/>
+      </a:dk2>
+      <a:lt2>
+        <a:srgbClr val="E7E6E6"/>
+      </a:lt2>
+      <a:accent1>
+        <a:srgbClr val="4472C4"/>
+      </a:accent1>
+      <a:accent2>
+        <a:srgbClr val="ED7D31"/>
+      </a:accent2>
+      <a:accent3>
+        <a:srgbClr val="A5A5A5"/>
+      </a:accent3>
+      <a:accent4>
+        <a:srgbClr val="FFC000"/>
+      </a:accent4>
+      <a:accent5>
+        <a:srgbClr val="5B9BD5"/>
+      </a:accent5>
+      <a:accent6>
+        <a:srgbClr val="70AD47"/>
+      </a:accent6>
+      <a:hlink>
+        <a:srgbClr val="0563C1"/>
+      </a:hlink>
+      <a:folHlink>
+        <a:srgbClr val="954F72"/>
+      </a:folHlink>
+    </a:clrScheme>
+    <a:fontScheme name="Office">
+      <a:majorFont>
+        <a:latin typeface="Calibri Light" panose="020F0302020204030204"/>
+        <a:ea typeface=""/>
+        <a:cs typeface=""/>
+        <a:font script="Jpan" typeface="游ゴシック Light"/>
+        <a:font script="Hang" typeface="맑은 고딕"/>
+        <a:font script="Hans" typeface="等线 Light"/>
+        <a:font script="Hant" typeface="新細明體"/>
+        <a:font script="Arab" typeface="Times New Roman"/>
+        <a:font script="Hebr" typeface="Times New Roman"/>
+        <a:font script="Thai" typeface="Angsana New"/>
+        <a:font script="Ethi" typeface="Nyala"/>
+        <a:font script="Beng" typeface="Vrinda"/>
+        <a:font script="Gujr" typeface="Shruti"/>
+        <a:font script="Khmr" typeface="MoolBoran"/>
+        <a:font script="Knda" typeface="Tunga"/>
+        <a:font script="Guru" typeface="Raavi"/>
+        <a:font script="Cans" typeface="Euphemia"/>
+        <a:font script="Cher" typeface="Plantagenet Cherokee"/>
+        <a:font script="Yiii" typeface="Microsoft Yi Baiti"/>
+        <a:font script="Tibt" typeface="Microsoft Himalaya"/>
+        <a:font script="Thaa" typeface="MV Boli"/>
+        <a:font script="Deva" typeface="Mangal"/>
+        <a:font script="Telu" typeface="Gautami"/>
+        <a:font script="Taml" typeface="Latha"/>
+        <a:font script="Syrc" typeface="Estrangelo Edessa"/>
+        <a:font script="Orya" typeface="Kalinga"/>
+        <a:font script="Mlym" typeface="Kartika"/>
+        <a:font script="Laoo" typeface="DokChampa"/>
+        <a:font script="Sinh" typeface="Iskoola Pota"/>
+        <a:font script="Mong" typeface="Mongolian Baiti"/>
+        <a:font script="Viet" typeface="Times New Roman"/>
+        <a:font script="Uigh" typeface="Microsoft Uighur"/>
+        <a:font script="Geor" typeface="Sylfaen"/>
+        <a:font script="Armn" typeface="Arial"/>
+        <a:font script="Bugi" typeface="Leelawadee UI"/>
+        <a:font script="Bopo" typeface="Microsoft JhengHei"/>
+        <a:font script="Java" typeface="Javanese Text"/>
+        <a:font script="Lisu" typeface="Segoe UI"/>
+        <a:font script="Mymr" typeface="Myanmar Text"/>
+        <a:font script="Nkoo" typeface="Ebrima"/>
+        <a:font script="Olck" typeface="Nirmala UI"/>
+        <a:font script="Osma" typeface="Ebrima"/>
+        <a:font script="Phag" typeface="Phagspa"/>
+        <a:font script="Syrn" typeface="Estrangelo Edessa"/>
+        <a:font script="Syrj" typeface="Estrangelo Edessa"/>
+        <a:font script="Syre" typeface="Estrangelo Edessa"/>
+        <a:font script="Sora" typeface="Nirmala UI"/>
+        <a:font script="Tale" typeface="Microsoft Tai Le"/>
+        <a:font script="Talu" typeface="Microsoft New Tai Lue"/>
+        <a:font script="Tfng" typeface="Ebrima"/>
+      </a:majorFont>
+      <a:minorFont>
+        <a:latin typeface="Calibri" panose="020F0502020204030204"/>
+        <a:ea typeface=""/>
+        <a:cs typeface=""/>
+        <a:font script="Jpan" typeface="游ゴシック"/>
+        <a:font script="Hang" typeface="맑은 고딕"/>
+        <a:font script="Hans" typeface="等线"/>
+        <a:font script="Hant" typeface="新細明體"/>
+        <a:font script="Arab" typeface="Arial"/>
+        <a:font script="Hebr" typeface="Arial"/>
+        <a:font script="Thai" typeface="Cordia New"/>
+        <a:font script="Ethi" typeface="Nyala"/>
+        <a:font script="Beng" typeface="Vrinda"/>
+        <a:font script="Gujr" typeface="Shruti"/>
+        <a:font script="Khmr" typeface="DaunPenh"/>
+        <a:font script="Knda" typeface="Tunga"/>
+        <a:font script="Guru" typeface="Raavi"/>
+        <a:font script="Cans" typeface="Euphemia"/>
+        <a:font script="Cher" typeface="Plantagenet Cherokee"/>
+        <a:font script="Yiii" typeface="Microsoft Yi Baiti"/>
+        <a:font script="Tibt" typeface="Microsoft Himalaya"/>
+        <a:font script="Thaa" typeface="MV Boli"/>
+        <a:font script="Deva" typeface="Mangal"/>
+        <a:font script="Telu" typeface="Gautami"/>
+        <a:font script="Taml" typeface="Latha"/>
+        <a:font script="Syrc" typeface="Estrangelo Edessa"/>
+        <a:font script="Orya" typeface="Kalinga"/>
+        <a:font script="Mlym" typeface="Kartika"/>
+        <a:font script="Laoo" typeface="DokChampa"/>
+        <a:font script="Sinh" typeface="Iskoola Pota"/>
+        <a:font script="Mong" typeface="Mongolian Baiti"/>
+        <a:font script="Viet" typeface="Arial"/>
+        <a:font script="Uigh" typeface="Microsoft Uighur"/>
+        <a:font script="Geor" typeface="Sylfaen"/>
+        <a:font script="Armn" typeface="Arial"/>
+        <a:font script="Bugi" typeface="Leelawadee UI"/>
+        <a:font script="Bopo" typeface="Microsoft JhengHei"/>
+        <a:font script="Java" typeface="Javanese Text"/>
+        <a:font script="Lisu" typeface="Segoe UI"/>
+        <a:font script="Mymr" typeface="Myanmar Text"/>
+        <a:font script="Nkoo" typeface="Ebrima"/>
+        <a:font script="Olck" typeface="Nirmala UI"/>
+        <a:font script="Osma" typeface="Ebrima"/>
+        <a:font script="Phag" typeface="Phagspa"/>
+        <a:font script="Syrn" typeface="Estrangelo Edessa"/>
+        <a:font script="Syrj" typeface="Estrangelo Edessa"/>
+        <a:font script="Syre" typeface="Estrangelo Edessa"/>
+        <a:font script="Sora" typeface="Nirmala UI"/>
+        <a:font script="Tale" typeface="Microsoft Tai Le"/>
+        <a:font script="Talu" typeface="Microsoft New Tai Lue"/>
+        <a:font script="Tfng" typeface="Ebrima"/>
+      </a:minorFont>
+    </a:fontScheme>
+    <a:fmtScheme name="Office">
+      <a:fillStyleLst>
+        <a:solidFill>
+          <a:schemeClr val="phClr"/>
+        </a:solidFill>
+        <a:gradFill rotWithShape="1">
+          <a:gsLst>
+            <a:gs pos="0">
+              <a:schemeClr val="phClr">
+                <a:lumMod val="110000"/>
+                <a:satMod val="105000"/>
+                <a:tint val="67000"/>
+              </a:schemeClr>
+            </a:gs>
+            <a:gs pos="50000">
+              <a:schemeClr val="phClr">
+                <a:lumMod val="105000"/>
+                <a:satMod val="103000"/>
+                <a:tint val="73000"/>
+              </a:schemeClr>
+            </a:gs>
+            <a:gs pos="100000">
+              <a:schemeClr val="phClr">
+                <a:lumMod val="105000"/>
+                <a:satMod val="109000"/>
+                <a:tint val="81000"/>
+              </a:schemeClr>
+            </a:gs>
+          </a:gsLst>
+          <a:lin ang="5400000" scaled="0"/>
+        </a:gradFill>
+        <a:gradFill rotWithShape="1">
+          <a:gsLst>
+            <a:gs pos="0">
+              <a:schemeClr val="phClr">
+                <a:satMod val="103000"/>
+                <a:lumMod val="102000"/>
+                <a:tint val="94000"/>
+              </a:schemeClr>
+            </a:gs>
+            <a:gs pos="50000">
+              <a:schemeClr val="phClr">
+                <a:satMod val="110000"/>
+                <a:lumMod val="100000"/>
+                <a:shade val="100000"/>
+              </a:schemeClr>
+            </a:gs>
+            <a:gs pos="100000">
+              <a:schemeClr val="phClr">
+                <a:lumMod val="99000"/>
+                <a:satMod val="120000"/>
+                <a:shade val="78000"/>
+              </a:schemeClr>
+            </a:gs>
+          </a:gsLst>
+          <a:lin ang="5400000" scaled="0"/>
+        </a:gradFill>
+      </a:fillStyleLst>
+      <a:lnStyleLst>
+        <a:ln w="6350" cap="flat" cmpd="sng" algn="ctr">
+          <a:solidFill>
+            <a:schemeClr val="phClr"/>
+          </a:solidFill>
+          <a:prstDash val="solid"/>
+          <a:miter lim="800000"/>
+        </a:ln>
+        <a:ln w="12700" cap="flat" cmpd="sng" algn="ctr">
+          <a:solidFill>
+            <a:schemeClr val="phClr"/>
+          </a:solidFill>
+          <a:prstDash val="solid"/>
+          <a:miter lim="800000"/>
+        </a:ln>
+        <a:ln w="19050" cap="flat" cmpd="sng" algn="ctr">
+          <a:solidFill>
+            <a:schemeClr val="phClr"/>
+          </a:solidFill>
+          <a:prstDash val="solid"/>
+          <a:miter lim="800000"/>
+        </a:ln>
+      </a:lnStyleLst>
+      <a:effectStyleLst>
+        <a:effectStyle>
+          <a:effectLst/>
+        </a:effectStyle>
+        <a:effectStyle>
+          <a:effectLst/>
+        </a:effectStyle>
+        <a:effectStyle>
+          <a:effectLst>
+            <a:outerShdw blurRad="57150" dist="19050" dir="5400000" algn="ctr" rotWithShape="0">
+              <a:srgbClr val="000000">
+                <a:alpha val="63000"/>
+              </a:srgbClr>
+            </a:outerShdw>
+          </a:effectLst>
+        </a:effectStyle>
+      </a:effectStyleLst>
+      <a:bgFillStyleLst>
+        <a:solidFill>
+          <a:schemeClr val="phClr"/>
+        </a:solidFill>
+        <a:solidFill>
+          <a:schemeClr val="phClr">
+            <a:tint val="95000"/>
+            <a:satMod val="170000"/>
+          </a:schemeClr>
+        </a:solidFill>
+        <a:gradFill rotWithShape="1">
+          <a:gsLst>
+            <a:gs pos="0">
+              <a:schemeClr val="phClr">
+                <a:tint val="93000"/>
+                <a:satMod val="150000"/>
+                <a:shade val="98000"/>
+                <a:lumMod val="102000"/>
+              </a:schemeClr>
+            </a:gs>
+            <a:gs pos="50000">
+              <a:schemeClr val="phClr">
+                <a:tint val="98000"/>
+                <a:satMod val="130000"/>
+                <a:shade val="90000"/>
+                <a:lumMod val="103000"/>
+              </a:schemeClr>
+            </a:gs>
+            <a:gs pos="100000">
+              <a:schemeClr val="phClr">
+                <a:shade val="63000"/>
+                <a:satMod val="120000"/>
+              </a:schemeClr>
+            </a:gs>
+          </a:gsLst>
+          <a:lin ang="5400000" scaled="0"/>
+        </a:gradFill>
+      </a:bgFillStyleLst>
+    </a:fmtScheme>
+  </a:themeElements>
+  <a:objectDefaults/>
+  <a:extraClrSchemeLst/>
+  <a:extLst>
+    <a:ext uri="{05A4C25C-085E-4340-85A3-A5531E510DB2}">
+      <thm15:themeFamily xmlns:thm15="http://schemas.microsoft.com/office/thememl/2012/main" name="Office Theme" id="{62F939B6-93AF-4DB8-9C6B-D6C7DFDC589F}" vid="{4A3C46E8-61CC-4603-A589-7422A47A8E4A}"/>
+    </a:ext>
+  </a:extLst>
+</a:theme>
 </file>
</xml_diff>